<commit_message>
Updated presentation slides -- need to update images
</commit_message>
<xml_diff>
--- a/Final Presentation.pptx
+++ b/Final Presentation.pptx
@@ -5,7 +5,7 @@
     <p:sldMasterId id="2147483888" r:id="rId1"/>
   </p:sldMasterIdLst>
   <p:notesMasterIdLst>
-    <p:notesMasterId r:id="rId24"/>
+    <p:notesMasterId r:id="rId25"/>
   </p:notesMasterIdLst>
   <p:sldIdLst>
     <p:sldId id="256" r:id="rId2"/>
@@ -20,16 +20,17 @@
     <p:sldId id="260" r:id="rId11"/>
     <p:sldId id="264" r:id="rId12"/>
     <p:sldId id="266" r:id="rId13"/>
-    <p:sldId id="267" r:id="rId14"/>
-    <p:sldId id="279" r:id="rId15"/>
-    <p:sldId id="278" r:id="rId16"/>
-    <p:sldId id="268" r:id="rId17"/>
-    <p:sldId id="269" r:id="rId18"/>
-    <p:sldId id="271" r:id="rId19"/>
-    <p:sldId id="274" r:id="rId20"/>
-    <p:sldId id="272" r:id="rId21"/>
-    <p:sldId id="270" r:id="rId22"/>
-    <p:sldId id="261" r:id="rId23"/>
+    <p:sldId id="281" r:id="rId14"/>
+    <p:sldId id="280" r:id="rId15"/>
+    <p:sldId id="267" r:id="rId16"/>
+    <p:sldId id="279" r:id="rId17"/>
+    <p:sldId id="268" r:id="rId18"/>
+    <p:sldId id="269" r:id="rId19"/>
+    <p:sldId id="271" r:id="rId20"/>
+    <p:sldId id="274" r:id="rId21"/>
+    <p:sldId id="272" r:id="rId22"/>
+    <p:sldId id="270" r:id="rId23"/>
+    <p:sldId id="261" r:id="rId24"/>
   </p:sldIdLst>
   <p:sldSz cx="12192000" cy="6858000"/>
   <p:notesSz cx="6858000" cy="9144000"/>
@@ -1657,14 +1658,14 @@
       </dgm:t>
     </dgm:pt>
     <dgm:pt modelId="{B300D9E8-2877-4A41-B5CC-D6735560A220}">
-      <dgm:prSet phldrT="[Text]"/>
+      <dgm:prSet phldrT="[Text]" custT="1"/>
       <dgm:spPr/>
       <dgm:t>
         <a:bodyPr/>
         <a:lstStyle/>
         <a:p>
           <a:r>
-            <a:rPr lang="en-US" dirty="0"/>
+            <a:rPr lang="en-US" sz="2800" dirty="0"/>
             <a:t>Error-free Internet</a:t>
           </a:r>
         </a:p>
@@ -1693,14 +1694,14 @@
       </dgm:t>
     </dgm:pt>
     <dgm:pt modelId="{5B605C8F-8BEF-8241-B137-888CC4B2DC15}">
-      <dgm:prSet phldrT="[Text]"/>
+      <dgm:prSet phldrT="[Text]" custT="1"/>
       <dgm:spPr/>
       <dgm:t>
         <a:bodyPr/>
         <a:lstStyle/>
         <a:p>
           <a:r>
-            <a:rPr lang="en-US" dirty="0"/>
+            <a:rPr lang="en-US" sz="2000" dirty="0"/>
             <a:t>Configuration Synthesis</a:t>
           </a:r>
         </a:p>
@@ -1729,14 +1730,14 @@
       </dgm:t>
     </dgm:pt>
     <dgm:pt modelId="{3CF46C46-5ACC-FB4F-9D10-D635A855C8CC}">
-      <dgm:prSet phldrT="[Text]"/>
+      <dgm:prSet phldrT="[Text]" custT="1"/>
       <dgm:spPr/>
       <dgm:t>
         <a:bodyPr/>
         <a:lstStyle/>
         <a:p>
           <a:r>
-            <a:rPr lang="en-US" dirty="0"/>
+            <a:rPr lang="en-US" sz="2000" dirty="0"/>
             <a:t>Development Tools</a:t>
           </a:r>
         </a:p>
@@ -1765,14 +1766,14 @@
       </dgm:t>
     </dgm:pt>
     <dgm:pt modelId="{1D95250A-1DFB-5542-B6AB-DAB3C52D0291}">
-      <dgm:prSet phldrT="[Text]"/>
+      <dgm:prSet phldrT="[Text]" custT="1"/>
       <dgm:spPr/>
       <dgm:t>
         <a:bodyPr/>
         <a:lstStyle/>
         <a:p>
           <a:r>
-            <a:rPr lang="en-US" dirty="0"/>
+            <a:rPr lang="en-US" sz="2000" dirty="0"/>
             <a:t>Network Verification</a:t>
           </a:r>
         </a:p>
@@ -1817,7 +1818,7 @@
       <dgm:spPr/>
     </dgm:pt>
     <dgm:pt modelId="{3F4EE6CD-B512-A648-A4F0-CA2A12F9A38F}" type="pres">
-      <dgm:prSet presAssocID="{B300D9E8-2877-4A41-B5CC-D6735560A220}" presName="singleCenter" presStyleLbl="node1" presStyleIdx="0" presStyleCnt="4" custScaleX="374585" custScaleY="103276" custLinFactNeighborX="-2184" custLinFactNeighborY="-50087">
+      <dgm:prSet presAssocID="{B300D9E8-2877-4A41-B5CC-D6735560A220}" presName="singleCenter" presStyleLbl="node1" presStyleIdx="0" presStyleCnt="4" custScaleX="423175" custScaleY="96618" custLinFactNeighborX="-2184" custLinFactNeighborY="-50087">
         <dgm:presLayoutVars>
           <dgm:chMax val="7"/>
           <dgm:chPref val="7"/>
@@ -1834,7 +1835,7 @@
       <dgm:spPr/>
     </dgm:pt>
     <dgm:pt modelId="{BD47E5AD-9B9F-994B-A283-396DB16C1ADF}" type="pres">
-      <dgm:prSet presAssocID="{3CF46C46-5ACC-FB4F-9D10-D635A855C8CC}" presName="text0" presStyleLbl="node1" presStyleIdx="1" presStyleCnt="4" custScaleX="203579" custScaleY="131160" custRadScaleRad="50803" custRadScaleInc="-285765">
+      <dgm:prSet presAssocID="{3CF46C46-5ACC-FB4F-9D10-D635A855C8CC}" presName="text0" presStyleLbl="node1" presStyleIdx="1" presStyleCnt="4" custScaleX="227615" custScaleY="113807" custRadScaleRad="20525" custRadScaleInc="-276594">
         <dgm:presLayoutVars>
           <dgm:bulletEnabled val="1"/>
         </dgm:presLayoutVars>
@@ -1846,7 +1847,7 @@
       <dgm:spPr/>
     </dgm:pt>
     <dgm:pt modelId="{0700E98B-D968-5D4A-84E8-8E9B9A58B1F4}" type="pres">
-      <dgm:prSet presAssocID="{1D95250A-1DFB-5542-B6AB-DAB3C52D0291}" presName="text0" presStyleLbl="node1" presStyleIdx="2" presStyleCnt="4" custScaleX="205673" custScaleY="117336" custRadScaleRad="142364" custRadScaleInc="-35933">
+      <dgm:prSet presAssocID="{1D95250A-1DFB-5542-B6AB-DAB3C52D0291}" presName="text0" presStyleLbl="node1" presStyleIdx="2" presStyleCnt="4" custScaleX="227904" custScaleY="113807" custRadScaleRad="140349" custRadScaleInc="-26156">
         <dgm:presLayoutVars>
           <dgm:bulletEnabled val="1"/>
         </dgm:presLayoutVars>
@@ -1858,7 +1859,7 @@
       <dgm:spPr/>
     </dgm:pt>
     <dgm:pt modelId="{471B17D5-08DD-F44C-A425-0677AFEB5931}" type="pres">
-      <dgm:prSet presAssocID="{5B605C8F-8BEF-8241-B137-888CC4B2DC15}" presName="text0" presStyleLbl="node1" presStyleIdx="3" presStyleCnt="4" custScaleX="234811" custScaleY="146390" custRadScaleRad="164776" custRadScaleInc="38315">
+      <dgm:prSet presAssocID="{5B605C8F-8BEF-8241-B137-888CC4B2DC15}" presName="text0" presStyleLbl="node1" presStyleIdx="3" presStyleCnt="4" custScaleX="227615" custScaleY="113808" custRadScaleRad="157270" custRadScaleInc="30966">
         <dgm:presLayoutVars>
           <dgm:bulletEnabled val="1"/>
         </dgm:presLayoutVars>
@@ -2245,8 +2246,8 @@
       </dsp:nvSpPr>
       <dsp:spPr>
         <a:xfrm>
-          <a:off x="1630146" y="0"/>
-          <a:ext cx="4492013" cy="1238483"/>
+          <a:off x="1280272" y="34246"/>
+          <a:ext cx="5074704" cy="1158640"/>
         </a:xfrm>
         <a:prstGeom prst="cloud">
           <a:avLst/>
@@ -2309,12 +2310,12 @@
         </a:fontRef>
       </dsp:style>
       <dsp:txBody>
-        <a:bodyPr spcFirstLastPara="0" vert="horz" wrap="square" lIns="68580" tIns="68580" rIns="68580" bIns="68580" numCol="1" spcCol="1270" anchor="ctr" anchorCtr="0">
+        <a:bodyPr spcFirstLastPara="0" vert="horz" wrap="square" lIns="71120" tIns="71120" rIns="71120" bIns="71120" numCol="1" spcCol="1270" anchor="ctr" anchorCtr="0">
           <a:noAutofit/>
         </a:bodyPr>
         <a:lstStyle/>
         <a:p>
-          <a:pPr marL="0" lvl="0" indent="0" algn="ctr" defTabSz="1200150">
+          <a:pPr marL="0" lvl="0" indent="0" algn="ctr" defTabSz="1244600">
             <a:lnSpc>
               <a:spcPct val="90000"/>
             </a:lnSpc>
@@ -2327,14 +2328,14 @@
             <a:buNone/>
           </a:pPr>
           <a:r>
-            <a:rPr lang="en-US" sz="2700" kern="1200" dirty="0"/>
+            <a:rPr lang="en-US" sz="2800" kern="1200" dirty="0"/>
             <a:t>Error-free Internet</a:t>
           </a:r>
         </a:p>
       </dsp:txBody>
       <dsp:txXfrm>
-        <a:off x="2249254" y="187034"/>
-        <a:ext cx="2934365" cy="807021"/>
+        <a:off x="1979688" y="209222"/>
+        <a:ext cx="3315004" cy="754994"/>
       </dsp:txXfrm>
     </dsp:sp>
     <dsp:sp modelId="{24EF86CB-BB3C-EE4A-8D63-6AA2B9CFE797}">
@@ -2343,9 +2344,9 @@
         <dsp:cNvSpPr/>
       </dsp:nvSpPr>
       <dsp:spPr>
-        <a:xfrm rot="5473565">
-          <a:off x="3051224" y="2032972"/>
-          <a:ext cx="1589342" cy="0"/>
+        <a:xfrm rot="5417537">
+          <a:off x="3223623" y="1780926"/>
+          <a:ext cx="1176093" cy="0"/>
         </a:xfrm>
         <a:custGeom>
           <a:avLst/>
@@ -2359,7 +2360,7 @@
                 <a:pt x="0" y="0"/>
               </a:moveTo>
               <a:lnTo>
-                <a:pt x="1589342" y="0"/>
+                <a:pt x="1176093" y="0"/>
               </a:lnTo>
             </a:path>
           </a:pathLst>
@@ -2399,8 +2400,8 @@
       </dsp:nvSpPr>
       <dsp:spPr>
         <a:xfrm>
-          <a:off x="2999773" y="2827462"/>
-          <a:ext cx="1635680" cy="1053821"/>
+          <a:off x="2891937" y="2368964"/>
+          <a:ext cx="1828800" cy="914396"/>
         </a:xfrm>
         <a:prstGeom prst="roundRect">
           <a:avLst/>
@@ -2463,12 +2464,12 @@
         </a:fontRef>
       </dsp:style>
       <dsp:txBody>
-        <a:bodyPr spcFirstLastPara="0" vert="horz" wrap="square" lIns="48260" tIns="48260" rIns="48260" bIns="48260" numCol="1" spcCol="1270" anchor="ctr" anchorCtr="0">
+        <a:bodyPr spcFirstLastPara="0" vert="horz" wrap="square" lIns="50800" tIns="50800" rIns="50800" bIns="50800" numCol="1" spcCol="1270" anchor="ctr" anchorCtr="0">
           <a:noAutofit/>
         </a:bodyPr>
         <a:lstStyle/>
         <a:p>
-          <a:pPr marL="0" lvl="0" indent="0" algn="ctr" defTabSz="844550">
+          <a:pPr marL="0" lvl="0" indent="0" algn="ctr" defTabSz="889000">
             <a:lnSpc>
               <a:spcPct val="90000"/>
             </a:lnSpc>
@@ -2481,14 +2482,14 @@
             <a:buNone/>
           </a:pPr>
           <a:r>
-            <a:rPr lang="en-US" sz="1900" kern="1200" dirty="0"/>
+            <a:rPr lang="en-US" sz="2000" kern="1200" dirty="0"/>
             <a:t>Development Tools</a:t>
           </a:r>
         </a:p>
       </dsp:txBody>
       <dsp:txXfrm>
-        <a:off x="3051216" y="2878905"/>
-        <a:ext cx="1532794" cy="950935"/>
+        <a:off x="2936574" y="2413601"/>
+        <a:ext cx="1739526" cy="825122"/>
       </dsp:txXfrm>
     </dsp:sp>
     <dsp:sp modelId="{3AB574AE-6C3A-B94C-B0FB-08E8082B94F9}">
@@ -2497,9 +2498,9 @@
         <dsp:cNvSpPr/>
       </dsp:nvSpPr>
       <dsp:spPr>
-        <a:xfrm rot="2361751">
-          <a:off x="4433622" y="1790408"/>
-          <a:ext cx="1740470" cy="0"/>
+        <a:xfrm rot="2631193">
+          <a:off x="4129132" y="1916993"/>
+          <a:ext cx="2090335" cy="0"/>
         </a:xfrm>
         <a:custGeom>
           <a:avLst/>
@@ -2513,7 +2514,7 @@
                 <a:pt x="0" y="0"/>
               </a:moveTo>
               <a:lnTo>
-                <a:pt x="1740470" y="0"/>
+                <a:pt x="2090335" y="0"/>
               </a:lnTo>
             </a:path>
           </a:pathLst>
@@ -2553,8 +2554,8 @@
       </dsp:nvSpPr>
       <dsp:spPr>
         <a:xfrm>
-          <a:off x="5725053" y="2342332"/>
-          <a:ext cx="1652505" cy="942750"/>
+          <a:off x="5488303" y="2641099"/>
+          <a:ext cx="1831122" cy="914396"/>
         </a:xfrm>
         <a:prstGeom prst="roundRect">
           <a:avLst/>
@@ -2617,12 +2618,12 @@
         </a:fontRef>
       </dsp:style>
       <dsp:txBody>
-        <a:bodyPr spcFirstLastPara="0" vert="horz" wrap="square" lIns="58420" tIns="58420" rIns="58420" bIns="58420" numCol="1" spcCol="1270" anchor="ctr" anchorCtr="0">
+        <a:bodyPr spcFirstLastPara="0" vert="horz" wrap="square" lIns="50800" tIns="50800" rIns="50800" bIns="50800" numCol="1" spcCol="1270" anchor="ctr" anchorCtr="0">
           <a:noAutofit/>
         </a:bodyPr>
         <a:lstStyle/>
         <a:p>
-          <a:pPr marL="0" lvl="0" indent="0" algn="ctr" defTabSz="1022350">
+          <a:pPr marL="0" lvl="0" indent="0" algn="ctr" defTabSz="889000">
             <a:lnSpc>
               <a:spcPct val="90000"/>
             </a:lnSpc>
@@ -2635,14 +2636,14 @@
             <a:buNone/>
           </a:pPr>
           <a:r>
-            <a:rPr lang="en-US" sz="2300" kern="1200" dirty="0"/>
+            <a:rPr lang="en-US" sz="2000" kern="1200" dirty="0"/>
             <a:t>Network Verification</a:t>
           </a:r>
         </a:p>
       </dsp:txBody>
       <dsp:txXfrm>
-        <a:off x="5771074" y="2388353"/>
-        <a:ext cx="1560463" cy="850708"/>
+        <a:off x="5532940" y="2685736"/>
+        <a:ext cx="1741848" cy="825122"/>
       </dsp:txXfrm>
     </dsp:sp>
     <dsp:sp modelId="{DAE87EC9-2948-EE4C-A53E-8BD735D0084C}">
@@ -2651,9 +2652,9 @@
         <dsp:cNvSpPr/>
       </dsp:nvSpPr>
       <dsp:spPr>
-        <a:xfrm rot="8602555">
-          <a:off x="1573525" y="1724832"/>
-          <a:ext cx="1630507" cy="0"/>
+        <a:xfrm rot="8325600">
+          <a:off x="1319087" y="1884371"/>
+          <a:ext cx="2097903" cy="0"/>
         </a:xfrm>
         <a:custGeom>
           <a:avLst/>
@@ -2667,7 +2668,7 @@
                 <a:pt x="0" y="0"/>
               </a:moveTo>
               <a:lnTo>
-                <a:pt x="1630507" y="0"/>
+                <a:pt x="2097903" y="0"/>
               </a:lnTo>
             </a:path>
           </a:pathLst>
@@ -2707,8 +2708,8 @@
       </dsp:nvSpPr>
       <dsp:spPr>
         <a:xfrm>
-          <a:off x="0" y="2211182"/>
-          <a:ext cx="1886617" cy="1176188"/>
+          <a:off x="143351" y="2575855"/>
+          <a:ext cx="1828800" cy="914404"/>
         </a:xfrm>
         <a:prstGeom prst="roundRect">
           <a:avLst/>
@@ -2771,12 +2772,12 @@
         </a:fontRef>
       </dsp:style>
       <dsp:txBody>
-        <a:bodyPr spcFirstLastPara="0" vert="horz" wrap="square" lIns="53340" tIns="53340" rIns="53340" bIns="53340" numCol="1" spcCol="1270" anchor="ctr" anchorCtr="0">
+        <a:bodyPr spcFirstLastPara="0" vert="horz" wrap="square" lIns="50800" tIns="50800" rIns="50800" bIns="50800" numCol="1" spcCol="1270" anchor="ctr" anchorCtr="0">
           <a:noAutofit/>
         </a:bodyPr>
         <a:lstStyle/>
         <a:p>
-          <a:pPr marL="0" lvl="0" indent="0" algn="ctr" defTabSz="933450">
+          <a:pPr marL="0" lvl="0" indent="0" algn="ctr" defTabSz="889000">
             <a:lnSpc>
               <a:spcPct val="90000"/>
             </a:lnSpc>
@@ -2789,14 +2790,14 @@
             <a:buNone/>
           </a:pPr>
           <a:r>
-            <a:rPr lang="en-US" sz="2100" kern="1200" dirty="0"/>
+            <a:rPr lang="en-US" sz="2000" kern="1200" dirty="0"/>
             <a:t>Configuration Synthesis</a:t>
           </a:r>
         </a:p>
       </dsp:txBody>
       <dsp:txXfrm>
-        <a:off x="57417" y="2268599"/>
-        <a:ext cx="1771783" cy="1061354"/>
+        <a:off x="187989" y="2620493"/>
+        <a:ext cx="1739524" cy="825128"/>
       </dsp:txXfrm>
     </dsp:sp>
   </dsp:spTree>
@@ -10794,6 +10795,12 @@
               <a:t>Roles: core (w/in Colgate) vs edge (for internet)</a:t>
             </a:r>
           </a:p>
+          <a:p>
+            <a:r>
+              <a:rPr lang="en-US" dirty="0"/>
+              <a:t>Parameters: such as device name – go back to explain</a:t>
+            </a:r>
+          </a:p>
         </p:txBody>
       </p:sp>
       <p:sp>
@@ -11023,6 +11030,101 @@
     <p:extLst>
       <p:ext uri="{BB962C8B-B14F-4D97-AF65-F5344CB8AC3E}">
         <p14:creationId xmlns:p14="http://schemas.microsoft.com/office/powerpoint/2010/main" val="1056491258"/>
+      </p:ext>
+    </p:extLst>
+  </p:cSld>
+  <p:clrMapOvr>
+    <a:masterClrMapping/>
+  </p:clrMapOvr>
+</p:notes>
+</file>
+
+<file path=ppt/notesSlides/notesSlide7.xml><?xml version="1.0" encoding="utf-8"?>
+<p:notes xmlns:a="http://schemas.openxmlformats.org/drawingml/2006/main" xmlns:r="http://schemas.openxmlformats.org/officeDocument/2006/relationships" xmlns:p="http://schemas.openxmlformats.org/presentationml/2006/main">
+  <p:cSld>
+    <p:spTree>
+      <p:nvGrpSpPr>
+        <p:cNvPr id="1" name=""/>
+        <p:cNvGrpSpPr/>
+        <p:nvPr/>
+      </p:nvGrpSpPr>
+      <p:grpSpPr>
+        <a:xfrm>
+          <a:off x="0" y="0"/>
+          <a:ext cx="0" cy="0"/>
+          <a:chOff x="0" y="0"/>
+          <a:chExt cx="0" cy="0"/>
+        </a:xfrm>
+      </p:grpSpPr>
+      <p:sp>
+        <p:nvSpPr>
+          <p:cNvPr id="2" name="Slide Image Placeholder 1"/>
+          <p:cNvSpPr>
+            <a:spLocks noGrp="1" noRot="1" noChangeAspect="1"/>
+          </p:cNvSpPr>
+          <p:nvPr>
+            <p:ph type="sldImg"/>
+          </p:nvPr>
+        </p:nvSpPr>
+        <p:spPr/>
+      </p:sp>
+      <p:sp>
+        <p:nvSpPr>
+          <p:cNvPr id="3" name="Notes Placeholder 2"/>
+          <p:cNvSpPr>
+            <a:spLocks noGrp="1"/>
+          </p:cNvSpPr>
+          <p:nvPr>
+            <p:ph type="body" idx="1"/>
+          </p:nvPr>
+        </p:nvSpPr>
+        <p:spPr/>
+        <p:txBody>
+          <a:bodyPr/>
+          <a:lstStyle/>
+          <a:p>
+            <a:r>
+              <a:rPr lang="en-US" dirty="0"/>
+              <a:t>Engine can help you figure out whether you need </a:t>
+            </a:r>
+            <a:r>
+              <a:rPr lang="en-US" dirty="0" err="1"/>
+              <a:t>ipadress</a:t>
+            </a:r>
+            <a:r>
+              <a:rPr lang="en-US" dirty="0"/>
+              <a:t> here or not</a:t>
+            </a:r>
+          </a:p>
+        </p:txBody>
+      </p:sp>
+      <p:sp>
+        <p:nvSpPr>
+          <p:cNvPr id="4" name="Slide Number Placeholder 3"/>
+          <p:cNvSpPr>
+            <a:spLocks noGrp="1"/>
+          </p:cNvSpPr>
+          <p:nvPr>
+            <p:ph type="sldNum" sz="quarter" idx="10"/>
+          </p:nvPr>
+        </p:nvSpPr>
+        <p:spPr/>
+        <p:txBody>
+          <a:bodyPr/>
+          <a:lstStyle/>
+          <a:p>
+            <a:fld id="{F49BE409-5689-8842-BA33-FFFC974D2438}" type="slidenum">
+              <a:rPr lang="en-US" smtClean="0"/>
+              <a:t>12</a:t>
+            </a:fld>
+            <a:endParaRPr lang="en-US"/>
+          </a:p>
+        </p:txBody>
+      </p:sp>
+    </p:spTree>
+    <p:extLst>
+      <p:ext uri="{BB962C8B-B14F-4D97-AF65-F5344CB8AC3E}">
+        <p14:creationId xmlns:p14="http://schemas.microsoft.com/office/powerpoint/2010/main" val="2974768820"/>
       </p:ext>
     </p:extLst>
   </p:cSld>
@@ -15503,12 +15605,23 @@
           </a:xfrm>
         </p:spPr>
         <p:txBody>
-          <a:bodyPr/>
+          <a:bodyPr anchor="t">
+            <a:normAutofit/>
+          </a:bodyPr>
           <a:lstStyle/>
           <a:p>
-            <a:r>
-              <a:rPr lang="en-US" dirty="0"/>
-              <a:t>Ahsan Mahmood</a:t>
+            <a:pPr algn="l"/>
+            <a:r>
+              <a:rPr lang="en-US" sz="2000" dirty="0"/>
+              <a:t>Ahsan Mahmood, Aaron </a:t>
+            </a:r>
+            <a:r>
+              <a:rPr lang="en-US" sz="2000" dirty="0" err="1"/>
+              <a:t>Gember</a:t>
+            </a:r>
+            <a:r>
+              <a:rPr lang="en-US" sz="2000" dirty="0"/>
+              <a:t>-Jacobson</a:t>
             </a:r>
           </a:p>
         </p:txBody>
@@ -16581,7 +16694,7 @@
             </a:r>
             <a:r>
               <a:rPr lang="en-US" sz="1600" dirty="0"/>
-              <a:t> IPADDRESS</a:t>
+              <a:t> SUBNET</a:t>
             </a:r>
           </a:p>
           <a:p>
@@ -16600,6 +16713,14 @@
             <a:r>
               <a:rPr lang="en-US" sz="1600" dirty="0"/>
               <a:t>interface </a:t>
+            </a:r>
+            <a:r>
+              <a:rPr lang="en-US" sz="1600" dirty="0" err="1">
+                <a:solidFill>
+                  <a:schemeClr val="bg1"/>
+                </a:solidFill>
+              </a:rPr>
+              <a:t>GigabitEthernet</a:t>
             </a:r>
             <a:r>
               <a:rPr lang="en-US" sz="1600" u="sng" dirty="0" err="1">
@@ -16607,7 +16728,7 @@
                   <a:srgbClr val="FF0000"/>
                 </a:solidFill>
               </a:rPr>
-              <a:t>GigabitEthernet#ID</a:t>
+              <a:t>#ID</a:t>
             </a:r>
             <a:endParaRPr lang="en-US" sz="1600" u="sng" dirty="0">
               <a:solidFill>
@@ -16632,7 +16753,15 @@
             </a:r>
             <a:r>
               <a:rPr lang="en-US" sz="1600" dirty="0"/>
-              <a:t> address IPADDRESS IPADDRESS</a:t>
+              <a:t> address IPADDRESS </a:t>
+            </a:r>
+            <a:r>
+              <a:rPr lang="en-US" sz="1600" u="sng" dirty="0">
+                <a:solidFill>
+                  <a:srgbClr val="FF0000"/>
+                </a:solidFill>
+              </a:rPr>
+              <a:t>SUBNET</a:t>
             </a:r>
           </a:p>
           <a:p>
@@ -16700,13 +16829,13 @@
           <a:p>
             <a:r>
               <a:rPr lang="en-US" sz="1600" dirty="0"/>
-              <a:t>    network IPADDRESS IPADDRESS area 0</a:t>
+              <a:t>    network IPADDRESS SUBNET area 0</a:t>
             </a:r>
           </a:p>
           <a:p>
             <a:r>
               <a:rPr lang="en-US" sz="1600" dirty="0"/>
-              <a:t>    network IPADDRESS IPADDRESS area 0</a:t>
+              <a:t>    network IPADDRESS SUBNET area 0</a:t>
             </a:r>
           </a:p>
           <a:p>
@@ -16758,7 +16887,7 @@
           <p:cNvPr id="2" name="Title 1">
             <a:extLst>
               <a:ext uri="{FF2B5EF4-FFF2-40B4-BE49-F238E27FC236}">
-                <a16:creationId xmlns:a16="http://schemas.microsoft.com/office/drawing/2014/main" id="{12EDD980-2FF1-6A43-9A90-E021660DC185}"/>
+                <a16:creationId xmlns:a16="http://schemas.microsoft.com/office/drawing/2014/main" id="{B2646332-60AF-FF46-B034-DDCF8609464E}"/>
               </a:ext>
             </a:extLst>
           </p:cNvPr>
@@ -16774,11 +16903,7 @@
           <a:bodyPr/>
           <a:lstStyle/>
           <a:p>
-            <a:pPr algn="l"/>
-            <a:r>
-              <a:rPr lang="en-US" dirty="0"/>
-              <a:t>Testing Methodology</a:t>
-            </a:r>
+            <a:endParaRPr lang="en-US"/>
           </a:p>
         </p:txBody>
       </p:sp>
@@ -16787,7 +16912,7 @@
           <p:cNvPr id="3" name="Content Placeholder 2">
             <a:extLst>
               <a:ext uri="{FF2B5EF4-FFF2-40B4-BE49-F238E27FC236}">
-                <a16:creationId xmlns:a16="http://schemas.microsoft.com/office/drawing/2014/main" id="{52ADF445-4A71-4A47-B495-D5A05EC06DC4}"/>
+                <a16:creationId xmlns:a16="http://schemas.microsoft.com/office/drawing/2014/main" id="{BF23C3C0-25CF-314F-8124-0E6559884FB3}"/>
               </a:ext>
             </a:extLst>
           </p:cNvPr>
@@ -16800,38 +16925,33 @@
         </p:nvSpPr>
         <p:spPr>
           <a:xfrm>
-            <a:off x="2611807" y="2041956"/>
-            <a:ext cx="7958331" cy="3993084"/>
+            <a:off x="2773598" y="2052116"/>
+            <a:ext cx="8478601" cy="3497784"/>
           </a:xfrm>
         </p:spPr>
         <p:txBody>
-          <a:bodyPr>
-            <a:normAutofit/>
-          </a:bodyPr>
+          <a:bodyPr/>
           <a:lstStyle/>
           <a:p>
-            <a:r>
-              <a:rPr lang="en-US" dirty="0"/>
-              <a:t>Test on configurations from three large university networks</a:t>
-            </a:r>
-          </a:p>
-          <a:p>
-            <a:r>
-              <a:rPr lang="en-US" dirty="0"/>
-              <a:t> “Rebuild” the test configurations token-by-token invoking the model at each stage</a:t>
-            </a:r>
-          </a:p>
-          <a:p>
-            <a:r>
-              <a:rPr lang="en-US" dirty="0"/>
-              <a:t> A prediction is marked as successful when we suggest the correct token within three results</a:t>
-            </a:r>
-          </a:p>
-          <a:p>
-            <a:r>
-              <a:rPr lang="en-US" dirty="0"/>
-              <a:t>Perform leave-one- out cross validation</a:t>
-            </a:r>
+            <a:pPr marL="0" indent="0">
+              <a:buNone/>
+            </a:pPr>
+            <a:r>
+              <a:rPr lang="en-US" b="1" dirty="0"/>
+              <a:t>“If Your Data Is Bad, Your Machine Learning Tools Are Useless”</a:t>
+            </a:r>
+          </a:p>
+          <a:p>
+            <a:pPr marL="0" indent="0">
+              <a:buNone/>
+            </a:pPr>
+            <a:r>
+              <a:rPr lang="en-US" b="1" dirty="0"/>
+              <a:t>- Some guy</a:t>
+            </a:r>
+          </a:p>
+          <a:p>
+            <a:endParaRPr lang="en-US" dirty="0"/>
           </a:p>
         </p:txBody>
       </p:sp>
@@ -16840,7 +16960,7 @@
           <p:cNvPr id="4" name="Slide Number Placeholder 3">
             <a:extLst>
               <a:ext uri="{FF2B5EF4-FFF2-40B4-BE49-F238E27FC236}">
-                <a16:creationId xmlns:a16="http://schemas.microsoft.com/office/drawing/2014/main" id="{7124CDC2-F652-5F42-9813-BC9248D2A5C8}"/>
+                <a16:creationId xmlns:a16="http://schemas.microsoft.com/office/drawing/2014/main" id="{3CE5B2BD-93F1-3340-8036-79DF907F9930}"/>
               </a:ext>
             </a:extLst>
           </p:cNvPr>
@@ -16867,7 +16987,7 @@
     </p:spTree>
     <p:extLst>
       <p:ext uri="{BB962C8B-B14F-4D97-AF65-F5344CB8AC3E}">
-        <p14:creationId xmlns:p14="http://schemas.microsoft.com/office/powerpoint/2010/main" val="4180441357"/>
+        <p14:creationId xmlns:p14="http://schemas.microsoft.com/office/powerpoint/2010/main" val="4206590161"/>
       </p:ext>
     </p:extLst>
   </p:cSld>
@@ -16918,8 +17038,49 @@
             <a:pPr algn="l"/>
             <a:r>
               <a:rPr lang="en-US" dirty="0"/>
-              <a:t>Testing Methodology</a:t>
-            </a:r>
+              <a:t>Our cute little dataset</a:t>
+            </a:r>
+          </a:p>
+        </p:txBody>
+      </p:sp>
+      <p:sp>
+        <p:nvSpPr>
+          <p:cNvPr id="3" name="Content Placeholder 2">
+            <a:extLst>
+              <a:ext uri="{FF2B5EF4-FFF2-40B4-BE49-F238E27FC236}">
+                <a16:creationId xmlns:a16="http://schemas.microsoft.com/office/drawing/2014/main" id="{52ADF445-4A71-4A47-B495-D5A05EC06DC4}"/>
+              </a:ext>
+            </a:extLst>
+          </p:cNvPr>
+          <p:cNvSpPr>
+            <a:spLocks noGrp="1"/>
+          </p:cNvSpPr>
+          <p:nvPr>
+            <p:ph idx="1"/>
+          </p:nvPr>
+        </p:nvSpPr>
+        <p:spPr>
+          <a:xfrm>
+            <a:off x="2367145" y="5461001"/>
+            <a:ext cx="8411793" cy="732411"/>
+          </a:xfrm>
+        </p:spPr>
+        <p:txBody>
+          <a:bodyPr anchor="t">
+            <a:normAutofit fontScale="92500"/>
+          </a:bodyPr>
+          <a:lstStyle/>
+          <a:p>
+            <a:pPr marL="0" indent="0" algn="ctr">
+              <a:buNone/>
+            </a:pPr>
+            <a:r>
+              <a:rPr lang="en-US" sz="2200" dirty="0"/>
+              <a:t>Table 1: Acquired configurations from three large university networks</a:t>
+            </a:r>
+          </a:p>
+          <a:p>
+            <a:endParaRPr lang="en-US" sz="2200" dirty="0"/>
           </a:p>
         </p:txBody>
       </p:sp>
@@ -16952,6 +17113,550 @@
           </a:p>
         </p:txBody>
       </p:sp>
+      <p:graphicFrame>
+        <p:nvGraphicFramePr>
+          <p:cNvPr id="5" name="Content Placeholder 24" descr="Sample table with 4 columns, 7 rows." title="Sample table">
+            <a:extLst>
+              <a:ext uri="{FF2B5EF4-FFF2-40B4-BE49-F238E27FC236}">
+                <a16:creationId xmlns:a16="http://schemas.microsoft.com/office/drawing/2014/main" id="{001BA615-67E0-2344-822B-7E836476D291}"/>
+              </a:ext>
+            </a:extLst>
+          </p:cNvPr>
+          <p:cNvGraphicFramePr>
+            <a:graphicFrameLocks/>
+          </p:cNvGraphicFramePr>
+          <p:nvPr>
+            <p:extLst>
+              <p:ext uri="{D42A27DB-BD31-4B8C-83A1-F6EECF244321}">
+                <p14:modId xmlns:p14="http://schemas.microsoft.com/office/powerpoint/2010/main" val="2545559618"/>
+              </p:ext>
+            </p:extLst>
+          </p:nvPr>
+        </p:nvGraphicFramePr>
+        <p:xfrm>
+          <a:off x="2367145" y="1896066"/>
+          <a:ext cx="8447656" cy="3412535"/>
+        </p:xfrm>
+        <a:graphic>
+          <a:graphicData uri="http://schemas.openxmlformats.org/drawingml/2006/table">
+            <a:tbl>
+              <a:tblPr firstRow="1" bandRow="1">
+                <a:tableStyleId>{3B4B98B0-60AC-42C2-AFA5-B58CD77FA1E5}</a:tableStyleId>
+              </a:tblPr>
+              <a:tblGrid>
+                <a:gridCol w="2111914">
+                  <a:extLst>
+                    <a:ext uri="{9D8B030D-6E8A-4147-A177-3AD203B41FA5}">
+                      <a16:colId xmlns:a16="http://schemas.microsoft.com/office/drawing/2014/main" val="20000"/>
+                    </a:ext>
+                  </a:extLst>
+                </a:gridCol>
+                <a:gridCol w="2282286">
+                  <a:extLst>
+                    <a:ext uri="{9D8B030D-6E8A-4147-A177-3AD203B41FA5}">
+                      <a16:colId xmlns:a16="http://schemas.microsoft.com/office/drawing/2014/main" val="20001"/>
+                    </a:ext>
+                  </a:extLst>
+                </a:gridCol>
+                <a:gridCol w="1941542">
+                  <a:extLst>
+                    <a:ext uri="{9D8B030D-6E8A-4147-A177-3AD203B41FA5}">
+                      <a16:colId xmlns:a16="http://schemas.microsoft.com/office/drawing/2014/main" val="20002"/>
+                    </a:ext>
+                  </a:extLst>
+                </a:gridCol>
+                <a:gridCol w="2111914">
+                  <a:extLst>
+                    <a:ext uri="{9D8B030D-6E8A-4147-A177-3AD203B41FA5}">
+                      <a16:colId xmlns:a16="http://schemas.microsoft.com/office/drawing/2014/main" val="20003"/>
+                    </a:ext>
+                  </a:extLst>
+                </a:gridCol>
+              </a:tblGrid>
+              <a:tr h="1156496">
+                <a:tc>
+                  <a:txBody>
+                    <a:bodyPr/>
+                    <a:lstStyle/>
+                    <a:p>
+                      <a:pPr algn="ctr"/>
+                      <a:r>
+                        <a:rPr lang="en-US" sz="2000" dirty="0"/>
+                        <a:t>University</a:t>
+                      </a:r>
+                    </a:p>
+                  </a:txBody>
+                  <a:tcPr marL="83820" marR="83820" marT="41910" marB="41910" anchor="ctr"/>
+                </a:tc>
+                <a:tc>
+                  <a:txBody>
+                    <a:bodyPr/>
+                    <a:lstStyle/>
+                    <a:p>
+                      <a:pPr algn="ctr"/>
+                      <a:r>
+                        <a:rPr lang="en-US" sz="2000" dirty="0"/>
+                        <a:t>Number of Configurations</a:t>
+                      </a:r>
+                    </a:p>
+                  </a:txBody>
+                  <a:tcPr marL="83820" marR="83820" marT="41910" marB="41910" anchor="ctr"/>
+                </a:tc>
+                <a:tc>
+                  <a:txBody>
+                    <a:bodyPr/>
+                    <a:lstStyle/>
+                    <a:p>
+                      <a:pPr algn="ctr"/>
+                      <a:r>
+                        <a:rPr lang="en-US" sz="2000" dirty="0"/>
+                        <a:t>Total Lines</a:t>
+                      </a:r>
+                    </a:p>
+                  </a:txBody>
+                  <a:tcPr marL="83820" marR="83820" marT="41910" marB="41910" anchor="ctr"/>
+                </a:tc>
+                <a:tc>
+                  <a:txBody>
+                    <a:bodyPr/>
+                    <a:lstStyle/>
+                    <a:p>
+                      <a:pPr algn="ctr"/>
+                      <a:r>
+                        <a:rPr lang="en-US" sz="2000" dirty="0"/>
+                        <a:t>Average Lines</a:t>
+                      </a:r>
+                    </a:p>
+                  </a:txBody>
+                  <a:tcPr marL="83820" marR="83820" marT="41910" marB="41910" anchor="ctr"/>
+                </a:tc>
+                <a:extLst>
+                  <a:ext uri="{0D108BD9-81ED-4DB2-BD59-A6C34878D82A}">
+                    <a16:rowId xmlns:a16="http://schemas.microsoft.com/office/drawing/2014/main" val="10000"/>
+                  </a:ext>
+                </a:extLst>
+              </a:tr>
+              <a:tr h="752013">
+                <a:tc>
+                  <a:txBody>
+                    <a:bodyPr/>
+                    <a:lstStyle/>
+                    <a:p>
+                      <a:pPr algn="ctr"/>
+                      <a:r>
+                        <a:rPr lang="en-US" sz="2000" dirty="0"/>
+                        <a:t>A</a:t>
+                      </a:r>
+                    </a:p>
+                  </a:txBody>
+                  <a:tcPr marL="83820" marR="83820" marT="41910" marB="41910" anchor="ctr"/>
+                </a:tc>
+                <a:tc>
+                  <a:txBody>
+                    <a:bodyPr/>
+                    <a:lstStyle/>
+                    <a:p>
+                      <a:pPr algn="ctr"/>
+                      <a:r>
+                        <a:rPr lang="en-US" sz="2000" dirty="0"/>
+                        <a:t>35</a:t>
+                      </a:r>
+                    </a:p>
+                  </a:txBody>
+                  <a:tcPr marL="83820" marR="83820" marT="41910" marB="41910" anchor="ctr"/>
+                </a:tc>
+                <a:tc>
+                  <a:txBody>
+                    <a:bodyPr/>
+                    <a:lstStyle/>
+                    <a:p>
+                      <a:pPr algn="ctr"/>
+                      <a:r>
+                        <a:rPr lang="en-US" sz="2000" dirty="0"/>
+                        <a:t>73K</a:t>
+                      </a:r>
+                    </a:p>
+                  </a:txBody>
+                  <a:tcPr marL="83820" marR="83820" marT="41910" marB="41910" anchor="ctr"/>
+                </a:tc>
+                <a:tc>
+                  <a:txBody>
+                    <a:bodyPr/>
+                    <a:lstStyle/>
+                    <a:p>
+                      <a:pPr algn="ctr"/>
+                      <a:r>
+                        <a:rPr lang="en-US" sz="2000" dirty="0"/>
+                        <a:t>2.1K</a:t>
+                      </a:r>
+                    </a:p>
+                  </a:txBody>
+                  <a:tcPr marL="83820" marR="83820" marT="41910" marB="41910" anchor="ctr"/>
+                </a:tc>
+                <a:extLst>
+                  <a:ext uri="{0D108BD9-81ED-4DB2-BD59-A6C34878D82A}">
+                    <a16:rowId xmlns:a16="http://schemas.microsoft.com/office/drawing/2014/main" val="10001"/>
+                  </a:ext>
+                </a:extLst>
+              </a:tr>
+              <a:tr h="752013">
+                <a:tc>
+                  <a:txBody>
+                    <a:bodyPr/>
+                    <a:lstStyle/>
+                    <a:p>
+                      <a:pPr algn="ctr"/>
+                      <a:r>
+                        <a:rPr lang="en-US" sz="2000" dirty="0"/>
+                        <a:t>B</a:t>
+                      </a:r>
+                    </a:p>
+                  </a:txBody>
+                  <a:tcPr marL="83820" marR="83820" marT="41910" marB="41910" anchor="ctr"/>
+                </a:tc>
+                <a:tc>
+                  <a:txBody>
+                    <a:bodyPr/>
+                    <a:lstStyle/>
+                    <a:p>
+                      <a:pPr algn="ctr"/>
+                      <a:r>
+                        <a:rPr lang="en-US" sz="2000" dirty="0"/>
+                        <a:t>26</a:t>
+                      </a:r>
+                    </a:p>
+                  </a:txBody>
+                  <a:tcPr marL="83820" marR="83820" marT="41910" marB="41910" anchor="ctr"/>
+                </a:tc>
+                <a:tc>
+                  <a:txBody>
+                    <a:bodyPr/>
+                    <a:lstStyle/>
+                    <a:p>
+                      <a:pPr algn="ctr"/>
+                      <a:r>
+                        <a:rPr lang="en-US" sz="2000" dirty="0"/>
+                        <a:t>61K</a:t>
+                      </a:r>
+                    </a:p>
+                  </a:txBody>
+                  <a:tcPr marL="83820" marR="83820" marT="41910" marB="41910" anchor="ctr"/>
+                </a:tc>
+                <a:tc>
+                  <a:txBody>
+                    <a:bodyPr/>
+                    <a:lstStyle/>
+                    <a:p>
+                      <a:pPr algn="ctr"/>
+                      <a:r>
+                        <a:rPr lang="en-US" sz="2000" dirty="0"/>
+                        <a:t>2.3K</a:t>
+                      </a:r>
+                    </a:p>
+                  </a:txBody>
+                  <a:tcPr marL="83820" marR="83820" marT="41910" marB="41910" anchor="ctr"/>
+                </a:tc>
+                <a:extLst>
+                  <a:ext uri="{0D108BD9-81ED-4DB2-BD59-A6C34878D82A}">
+                    <a16:rowId xmlns:a16="http://schemas.microsoft.com/office/drawing/2014/main" val="10002"/>
+                  </a:ext>
+                </a:extLst>
+              </a:tr>
+              <a:tr h="752013">
+                <a:tc>
+                  <a:txBody>
+                    <a:bodyPr/>
+                    <a:lstStyle/>
+                    <a:p>
+                      <a:pPr algn="ctr"/>
+                      <a:r>
+                        <a:rPr lang="en-US" sz="2000" dirty="0"/>
+                        <a:t>C</a:t>
+                      </a:r>
+                    </a:p>
+                  </a:txBody>
+                  <a:tcPr marL="83820" marR="83820" marT="41910" marB="41910" anchor="ctr"/>
+                </a:tc>
+                <a:tc>
+                  <a:txBody>
+                    <a:bodyPr/>
+                    <a:lstStyle/>
+                    <a:p>
+                      <a:pPr algn="ctr"/>
+                      <a:r>
+                        <a:rPr lang="en-US" sz="2000" dirty="0"/>
+                        <a:t>24</a:t>
+                      </a:r>
+                    </a:p>
+                  </a:txBody>
+                  <a:tcPr marL="83820" marR="83820" marT="41910" marB="41910" anchor="ctr"/>
+                </a:tc>
+                <a:tc>
+                  <a:txBody>
+                    <a:bodyPr/>
+                    <a:lstStyle/>
+                    <a:p>
+                      <a:pPr algn="ctr"/>
+                      <a:r>
+                        <a:rPr lang="en-US" sz="2000" dirty="0"/>
+                        <a:t>67K</a:t>
+                      </a:r>
+                    </a:p>
+                  </a:txBody>
+                  <a:tcPr marL="83820" marR="83820" marT="41910" marB="41910" anchor="ctr"/>
+                </a:tc>
+                <a:tc>
+                  <a:txBody>
+                    <a:bodyPr/>
+                    <a:lstStyle/>
+                    <a:p>
+                      <a:pPr algn="ctr"/>
+                      <a:r>
+                        <a:rPr lang="en-US" sz="2000" dirty="0"/>
+                        <a:t>2.8K</a:t>
+                      </a:r>
+                    </a:p>
+                  </a:txBody>
+                  <a:tcPr marL="83820" marR="83820" marT="41910" marB="41910" anchor="ctr"/>
+                </a:tc>
+                <a:extLst>
+                  <a:ext uri="{0D108BD9-81ED-4DB2-BD59-A6C34878D82A}">
+                    <a16:rowId xmlns:a16="http://schemas.microsoft.com/office/drawing/2014/main" val="10003"/>
+                  </a:ext>
+                </a:extLst>
+              </a:tr>
+            </a:tbl>
+          </a:graphicData>
+        </a:graphic>
+      </p:graphicFrame>
+    </p:spTree>
+    <p:extLst>
+      <p:ext uri="{BB962C8B-B14F-4D97-AF65-F5344CB8AC3E}">
+        <p14:creationId xmlns:p14="http://schemas.microsoft.com/office/powerpoint/2010/main" val="2744475804"/>
+      </p:ext>
+    </p:extLst>
+  </p:cSld>
+  <p:clrMapOvr>
+    <a:masterClrMapping/>
+  </p:clrMapOvr>
+</p:sld>
+</file>
+
+<file path=ppt/slides/slide15.xml><?xml version="1.0" encoding="utf-8"?>
+<p:sld xmlns:a="http://schemas.openxmlformats.org/drawingml/2006/main" xmlns:r="http://schemas.openxmlformats.org/officeDocument/2006/relationships" xmlns:p="http://schemas.openxmlformats.org/presentationml/2006/main">
+  <p:cSld>
+    <p:spTree>
+      <p:nvGrpSpPr>
+        <p:cNvPr id="1" name=""/>
+        <p:cNvGrpSpPr/>
+        <p:nvPr/>
+      </p:nvGrpSpPr>
+      <p:grpSpPr>
+        <a:xfrm>
+          <a:off x="0" y="0"/>
+          <a:ext cx="0" cy="0"/>
+          <a:chOff x="0" y="0"/>
+          <a:chExt cx="0" cy="0"/>
+        </a:xfrm>
+      </p:grpSpPr>
+      <p:sp>
+        <p:nvSpPr>
+          <p:cNvPr id="2" name="Title 1">
+            <a:extLst>
+              <a:ext uri="{FF2B5EF4-FFF2-40B4-BE49-F238E27FC236}">
+                <a16:creationId xmlns:a16="http://schemas.microsoft.com/office/drawing/2014/main" id="{12EDD980-2FF1-6A43-9A90-E021660DC185}"/>
+              </a:ext>
+            </a:extLst>
+          </p:cNvPr>
+          <p:cNvSpPr>
+            <a:spLocks noGrp="1"/>
+          </p:cNvSpPr>
+          <p:nvPr>
+            <p:ph type="title"/>
+          </p:nvPr>
+        </p:nvSpPr>
+        <p:spPr/>
+        <p:txBody>
+          <a:bodyPr/>
+          <a:lstStyle/>
+          <a:p>
+            <a:pPr algn="l"/>
+            <a:r>
+              <a:rPr lang="en-US" dirty="0"/>
+              <a:t>Testing Methodology</a:t>
+            </a:r>
+          </a:p>
+        </p:txBody>
+      </p:sp>
+      <p:sp>
+        <p:nvSpPr>
+          <p:cNvPr id="3" name="Content Placeholder 2">
+            <a:extLst>
+              <a:ext uri="{FF2B5EF4-FFF2-40B4-BE49-F238E27FC236}">
+                <a16:creationId xmlns:a16="http://schemas.microsoft.com/office/drawing/2014/main" id="{52ADF445-4A71-4A47-B495-D5A05EC06DC4}"/>
+              </a:ext>
+            </a:extLst>
+          </p:cNvPr>
+          <p:cNvSpPr>
+            <a:spLocks noGrp="1"/>
+          </p:cNvSpPr>
+          <p:nvPr>
+            <p:ph idx="1"/>
+          </p:nvPr>
+        </p:nvSpPr>
+        <p:spPr>
+          <a:xfrm>
+            <a:off x="2243507" y="1936085"/>
+            <a:ext cx="7958331" cy="2750215"/>
+          </a:xfrm>
+        </p:spPr>
+        <p:txBody>
+          <a:bodyPr anchor="t">
+            <a:normAutofit/>
+          </a:bodyPr>
+          <a:lstStyle/>
+          <a:p>
+            <a:r>
+              <a:rPr lang="en-US" sz="2400" dirty="0"/>
+              <a:t> “Rebuild” the test configurations token-by-token </a:t>
+            </a:r>
+          </a:p>
+          <a:p>
+            <a:r>
+              <a:rPr lang="en-US" sz="2400" dirty="0"/>
+              <a:t>A prediction is marked as successful when we suggest the correct token within three results</a:t>
+            </a:r>
+          </a:p>
+          <a:p>
+            <a:r>
+              <a:rPr lang="en-US" sz="2400" dirty="0"/>
+              <a:t>Perform leave-one-out cross validation</a:t>
+            </a:r>
+          </a:p>
+        </p:txBody>
+      </p:sp>
+      <p:sp>
+        <p:nvSpPr>
+          <p:cNvPr id="4" name="Slide Number Placeholder 3">
+            <a:extLst>
+              <a:ext uri="{FF2B5EF4-FFF2-40B4-BE49-F238E27FC236}">
+                <a16:creationId xmlns:a16="http://schemas.microsoft.com/office/drawing/2014/main" id="{7124CDC2-F652-5F42-9813-BC9248D2A5C8}"/>
+              </a:ext>
+            </a:extLst>
+          </p:cNvPr>
+          <p:cNvSpPr>
+            <a:spLocks noGrp="1"/>
+          </p:cNvSpPr>
+          <p:nvPr>
+            <p:ph type="sldNum" sz="quarter" idx="12"/>
+          </p:nvPr>
+        </p:nvSpPr>
+        <p:spPr/>
+        <p:txBody>
+          <a:bodyPr/>
+          <a:lstStyle/>
+          <a:p>
+            <a:fld id="{6D22F896-40B5-4ADD-8801-0D06FADFA095}" type="slidenum">
+              <a:rPr lang="en-US" smtClean="0"/>
+              <a:t>15</a:t>
+            </a:fld>
+            <a:endParaRPr lang="en-US" dirty="0"/>
+          </a:p>
+        </p:txBody>
+      </p:sp>
+    </p:spTree>
+    <p:extLst>
+      <p:ext uri="{BB962C8B-B14F-4D97-AF65-F5344CB8AC3E}">
+        <p14:creationId xmlns:p14="http://schemas.microsoft.com/office/powerpoint/2010/main" val="4180441357"/>
+      </p:ext>
+    </p:extLst>
+  </p:cSld>
+  <p:clrMapOvr>
+    <a:masterClrMapping/>
+  </p:clrMapOvr>
+</p:sld>
+</file>
+
+<file path=ppt/slides/slide16.xml><?xml version="1.0" encoding="utf-8"?>
+<p:sld xmlns:a="http://schemas.openxmlformats.org/drawingml/2006/main" xmlns:r="http://schemas.openxmlformats.org/officeDocument/2006/relationships" xmlns:p="http://schemas.openxmlformats.org/presentationml/2006/main">
+  <p:cSld>
+    <p:spTree>
+      <p:nvGrpSpPr>
+        <p:cNvPr id="1" name=""/>
+        <p:cNvGrpSpPr/>
+        <p:nvPr/>
+      </p:nvGrpSpPr>
+      <p:grpSpPr>
+        <a:xfrm>
+          <a:off x="0" y="0"/>
+          <a:ext cx="0" cy="0"/>
+          <a:chOff x="0" y="0"/>
+          <a:chExt cx="0" cy="0"/>
+        </a:xfrm>
+      </p:grpSpPr>
+      <p:sp>
+        <p:nvSpPr>
+          <p:cNvPr id="2" name="Title 1">
+            <a:extLst>
+              <a:ext uri="{FF2B5EF4-FFF2-40B4-BE49-F238E27FC236}">
+                <a16:creationId xmlns:a16="http://schemas.microsoft.com/office/drawing/2014/main" id="{12EDD980-2FF1-6A43-9A90-E021660DC185}"/>
+              </a:ext>
+            </a:extLst>
+          </p:cNvPr>
+          <p:cNvSpPr>
+            <a:spLocks noGrp="1"/>
+          </p:cNvSpPr>
+          <p:nvPr>
+            <p:ph type="title"/>
+          </p:nvPr>
+        </p:nvSpPr>
+        <p:spPr>
+          <a:xfrm>
+            <a:off x="2611808" y="808056"/>
+            <a:ext cx="7958331" cy="881043"/>
+          </a:xfrm>
+        </p:spPr>
+        <p:txBody>
+          <a:bodyPr/>
+          <a:lstStyle/>
+          <a:p>
+            <a:pPr algn="l"/>
+            <a:r>
+              <a:rPr lang="en-US" dirty="0"/>
+              <a:t>Testing Methodology</a:t>
+            </a:r>
+          </a:p>
+        </p:txBody>
+      </p:sp>
+      <p:sp>
+        <p:nvSpPr>
+          <p:cNvPr id="4" name="Slide Number Placeholder 3">
+            <a:extLst>
+              <a:ext uri="{FF2B5EF4-FFF2-40B4-BE49-F238E27FC236}">
+                <a16:creationId xmlns:a16="http://schemas.microsoft.com/office/drawing/2014/main" id="{7124CDC2-F652-5F42-9813-BC9248D2A5C8}"/>
+              </a:ext>
+            </a:extLst>
+          </p:cNvPr>
+          <p:cNvSpPr>
+            <a:spLocks noGrp="1"/>
+          </p:cNvSpPr>
+          <p:nvPr>
+            <p:ph type="sldNum" sz="quarter" idx="12"/>
+          </p:nvPr>
+        </p:nvSpPr>
+        <p:spPr/>
+        <p:txBody>
+          <a:bodyPr/>
+          <a:lstStyle/>
+          <a:p>
+            <a:fld id="{6D22F896-40B5-4ADD-8801-0D06FADFA095}" type="slidenum">
+              <a:rPr lang="en-US" smtClean="0"/>
+              <a:t>16</a:t>
+            </a:fld>
+            <a:endParaRPr lang="en-US" dirty="0"/>
+          </a:p>
+        </p:txBody>
+      </p:sp>
       <p:sp>
         <p:nvSpPr>
           <p:cNvPr id="8" name="Document 7">
@@ -16966,8 +17671,8 @@
         </p:nvSpPr>
         <p:spPr>
           <a:xfrm>
-            <a:off x="6778487" y="1510748"/>
-            <a:ext cx="4426790" cy="5347253"/>
+            <a:off x="6743700" y="1839061"/>
+            <a:ext cx="4114303" cy="4839251"/>
           </a:xfrm>
           <a:prstGeom prst="flowChartDocument">
             <a:avLst/>
@@ -17191,8 +17896,8 @@
         </p:nvSpPr>
         <p:spPr>
           <a:xfrm>
-            <a:off x="1325217" y="1510748"/>
-            <a:ext cx="4426790" cy="5481349"/>
+            <a:off x="1365250" y="1839061"/>
+            <a:ext cx="4081173" cy="4839251"/>
           </a:xfrm>
           <a:prstGeom prst="flowChartDocument">
             <a:avLst/>
@@ -17319,7 +18024,7 @@
         </p:nvSpPr>
         <p:spPr>
           <a:xfrm>
-            <a:off x="1594388" y="3750687"/>
+            <a:off x="1607088" y="4080887"/>
             <a:ext cx="1232452" cy="867373"/>
           </a:xfrm>
           <a:prstGeom prst="wedgeRectCallout">
@@ -17385,7 +18090,7 @@
         </p:nvSpPr>
         <p:spPr>
           <a:xfrm>
-            <a:off x="1738990" y="4040061"/>
+            <a:off x="1738990" y="4408361"/>
             <a:ext cx="1006601" cy="331582"/>
           </a:xfrm>
           <a:prstGeom prst="ellipse">
@@ -17437,7 +18142,7 @@
         </p:nvSpPr>
         <p:spPr>
           <a:xfrm>
-            <a:off x="1738990" y="3224007"/>
+            <a:off x="1751690" y="3554207"/>
             <a:ext cx="943249" cy="338554"/>
           </a:xfrm>
           <a:prstGeom prst="rect">
@@ -17459,6 +18164,162 @@
               </a:rPr>
               <a:t>address</a:t>
             </a:r>
+          </a:p>
+        </p:txBody>
+      </p:sp>
+      <p:sp>
+        <p:nvSpPr>
+          <p:cNvPr id="13" name="Oval 12">
+            <a:extLst>
+              <a:ext uri="{FF2B5EF4-FFF2-40B4-BE49-F238E27FC236}">
+                <a16:creationId xmlns:a16="http://schemas.microsoft.com/office/drawing/2014/main" id="{48BCE406-3692-7943-8BA6-259D1DDA4F48}"/>
+              </a:ext>
+            </a:extLst>
+          </p:cNvPr>
+          <p:cNvSpPr/>
+          <p:nvPr/>
+        </p:nvSpPr>
+        <p:spPr>
+          <a:xfrm>
+            <a:off x="7250791" y="3561179"/>
+            <a:ext cx="864510" cy="331582"/>
+          </a:xfrm>
+          <a:prstGeom prst="ellipse">
+            <a:avLst/>
+          </a:prstGeom>
+          <a:noFill/>
+          <a:ln w="19050">
+            <a:solidFill>
+              <a:srgbClr val="FF0000"/>
+            </a:solidFill>
+          </a:ln>
+        </p:spPr>
+        <p:style>
+          <a:lnRef idx="2">
+            <a:schemeClr val="accent1">
+              <a:shade val="50000"/>
+            </a:schemeClr>
+          </a:lnRef>
+          <a:fillRef idx="1">
+            <a:schemeClr val="accent1"/>
+          </a:fillRef>
+          <a:effectRef idx="0">
+            <a:schemeClr val="accent1"/>
+          </a:effectRef>
+          <a:fontRef idx="minor">
+            <a:schemeClr val="lt1"/>
+          </a:fontRef>
+        </p:style>
+        <p:txBody>
+          <a:bodyPr rtlCol="0" anchor="ctr"/>
+          <a:lstStyle/>
+          <a:p>
+            <a:pPr algn="ctr"/>
+            <a:endParaRPr lang="en-US"/>
+          </a:p>
+        </p:txBody>
+      </p:sp>
+      <p:sp>
+        <p:nvSpPr>
+          <p:cNvPr id="14" name="Right Arrow 13">
+            <a:extLst>
+              <a:ext uri="{FF2B5EF4-FFF2-40B4-BE49-F238E27FC236}">
+                <a16:creationId xmlns:a16="http://schemas.microsoft.com/office/drawing/2014/main" id="{CE647149-8ACC-004C-8252-A4629F27FC94}"/>
+              </a:ext>
+            </a:extLst>
+          </p:cNvPr>
+          <p:cNvSpPr/>
+          <p:nvPr/>
+        </p:nvSpPr>
+        <p:spPr>
+          <a:xfrm>
+            <a:off x="1219200" y="3632200"/>
+            <a:ext cx="292100" cy="235161"/>
+          </a:xfrm>
+          <a:prstGeom prst="rightArrow">
+            <a:avLst/>
+          </a:prstGeom>
+          <a:solidFill>
+            <a:srgbClr val="FF0000"/>
+          </a:solidFill>
+          <a:ln>
+            <a:noFill/>
+          </a:ln>
+        </p:spPr>
+        <p:style>
+          <a:lnRef idx="2">
+            <a:schemeClr val="accent1">
+              <a:shade val="50000"/>
+            </a:schemeClr>
+          </a:lnRef>
+          <a:fillRef idx="1">
+            <a:schemeClr val="accent1"/>
+          </a:fillRef>
+          <a:effectRef idx="0">
+            <a:schemeClr val="accent1"/>
+          </a:effectRef>
+          <a:fontRef idx="minor">
+            <a:schemeClr val="lt1"/>
+          </a:fontRef>
+        </p:style>
+        <p:txBody>
+          <a:bodyPr rtlCol="0" anchor="ctr"/>
+          <a:lstStyle/>
+          <a:p>
+            <a:pPr algn="ctr"/>
+            <a:endParaRPr lang="en-US"/>
+          </a:p>
+        </p:txBody>
+      </p:sp>
+      <p:sp>
+        <p:nvSpPr>
+          <p:cNvPr id="15" name="Right Arrow 14">
+            <a:extLst>
+              <a:ext uri="{FF2B5EF4-FFF2-40B4-BE49-F238E27FC236}">
+                <a16:creationId xmlns:a16="http://schemas.microsoft.com/office/drawing/2014/main" id="{C0F943D2-FAEB-2045-8D54-5781C9D3841A}"/>
+              </a:ext>
+            </a:extLst>
+          </p:cNvPr>
+          <p:cNvSpPr/>
+          <p:nvPr/>
+        </p:nvSpPr>
+        <p:spPr>
+          <a:xfrm>
+            <a:off x="6743700" y="3632200"/>
+            <a:ext cx="292100" cy="235161"/>
+          </a:xfrm>
+          <a:prstGeom prst="rightArrow">
+            <a:avLst/>
+          </a:prstGeom>
+          <a:solidFill>
+            <a:srgbClr val="FF0000"/>
+          </a:solidFill>
+          <a:ln>
+            <a:noFill/>
+          </a:ln>
+        </p:spPr>
+        <p:style>
+          <a:lnRef idx="2">
+            <a:schemeClr val="accent1">
+              <a:shade val="50000"/>
+            </a:schemeClr>
+          </a:lnRef>
+          <a:fillRef idx="1">
+            <a:schemeClr val="accent1"/>
+          </a:fillRef>
+          <a:effectRef idx="0">
+            <a:schemeClr val="accent1"/>
+          </a:effectRef>
+          <a:fontRef idx="minor">
+            <a:schemeClr val="lt1"/>
+          </a:fontRef>
+        </p:style>
+        <p:txBody>
+          <a:bodyPr rtlCol="0" anchor="ctr"/>
+          <a:lstStyle/>
+          <a:p>
+            <a:pPr algn="ctr"/>
+            <a:endParaRPr lang="en-US"/>
           </a:p>
         </p:txBody>
       </p:sp>
@@ -17629,6 +18490,41 @@
                                   </p:childTnLst>
                                 </p:cTn>
                               </p:par>
+                              <p:par>
+                                <p:cTn id="17" presetID="22" presetClass="entr" presetSubtype="4" fill="hold" grpId="0" nodeType="withEffect">
+                                  <p:stCondLst>
+                                    <p:cond delay="0"/>
+                                  </p:stCondLst>
+                                  <p:childTnLst>
+                                    <p:set>
+                                      <p:cBhvr>
+                                        <p:cTn id="18" dur="1" fill="hold">
+                                          <p:stCondLst>
+                                            <p:cond delay="0"/>
+                                          </p:stCondLst>
+                                        </p:cTn>
+                                        <p:tgtEl>
+                                          <p:spTgt spid="13"/>
+                                        </p:tgtEl>
+                                        <p:attrNameLst>
+                                          <p:attrName>style.visibility</p:attrName>
+                                        </p:attrNameLst>
+                                      </p:cBhvr>
+                                      <p:to>
+                                        <p:strVal val="visible"/>
+                                      </p:to>
+                                    </p:set>
+                                    <p:animEffect transition="in" filter="wipe(down)">
+                                      <p:cBhvr>
+                                        <p:cTn id="19" dur="500"/>
+                                        <p:tgtEl>
+                                          <p:spTgt spid="13"/>
+                                        </p:tgtEl>
+                                      </p:cBhvr>
+                                    </p:animEffect>
+                                  </p:childTnLst>
+                                </p:cTn>
+                              </p:par>
                             </p:childTnLst>
                           </p:cTn>
                         </p:par>
@@ -17636,26 +18532,26 @@
                     </p:cTn>
                   </p:par>
                   <p:par>
-                    <p:cTn id="17" fill="hold">
+                    <p:cTn id="20" fill="hold">
                       <p:stCondLst>
                         <p:cond delay="indefinite"/>
                       </p:stCondLst>
                       <p:childTnLst>
                         <p:par>
-                          <p:cTn id="18" fill="hold">
+                          <p:cTn id="21" fill="hold">
                             <p:stCondLst>
                               <p:cond delay="0"/>
                             </p:stCondLst>
                             <p:childTnLst>
                               <p:par>
-                                <p:cTn id="19" presetID="1" presetClass="entr" presetSubtype="0" fill="hold" grpId="0" nodeType="clickEffect">
+                                <p:cTn id="22" presetID="1" presetClass="entr" presetSubtype="0" fill="hold" grpId="0" nodeType="clickEffect">
                                   <p:stCondLst>
                                     <p:cond delay="0"/>
                                   </p:stCondLst>
                                   <p:childTnLst>
                                     <p:set>
                                       <p:cBhvr>
-                                        <p:cTn id="20" dur="1" fill="hold">
+                                        <p:cTn id="23" dur="1" fill="hold">
                                           <p:stCondLst>
                                             <p:cond delay="0"/>
                                           </p:stCondLst>
@@ -17705,121 +18601,13 @@
       <p:bldP spid="10" grpId="0" animBg="1"/>
       <p:bldP spid="11" grpId="0" animBg="1"/>
       <p:bldP spid="12" grpId="0"/>
+      <p:bldP spid="13" grpId="0" animBg="1"/>
     </p:bldLst>
   </p:timing>
 </p:sld>
 </file>
 
-<file path=ppt/slides/slide15.xml><?xml version="1.0" encoding="utf-8"?>
-<p:sld xmlns:a="http://schemas.openxmlformats.org/drawingml/2006/main" xmlns:r="http://schemas.openxmlformats.org/officeDocument/2006/relationships" xmlns:p="http://schemas.openxmlformats.org/presentationml/2006/main">
-  <p:cSld>
-    <p:spTree>
-      <p:nvGrpSpPr>
-        <p:cNvPr id="1" name=""/>
-        <p:cNvGrpSpPr/>
-        <p:nvPr/>
-      </p:nvGrpSpPr>
-      <p:grpSpPr>
-        <a:xfrm>
-          <a:off x="0" y="0"/>
-          <a:ext cx="0" cy="0"/>
-          <a:chOff x="0" y="0"/>
-          <a:chExt cx="0" cy="0"/>
-        </a:xfrm>
-      </p:grpSpPr>
-      <p:sp>
-        <p:nvSpPr>
-          <p:cNvPr id="2" name="Title 1">
-            <a:extLst>
-              <a:ext uri="{FF2B5EF4-FFF2-40B4-BE49-F238E27FC236}">
-                <a16:creationId xmlns:a16="http://schemas.microsoft.com/office/drawing/2014/main" id="{635983EE-57C4-1644-9895-F7FDF230D424}"/>
-              </a:ext>
-            </a:extLst>
-          </p:cNvPr>
-          <p:cNvSpPr>
-            <a:spLocks noGrp="1"/>
-          </p:cNvSpPr>
-          <p:nvPr>
-            <p:ph type="title"/>
-          </p:nvPr>
-        </p:nvSpPr>
-        <p:spPr/>
-        <p:txBody>
-          <a:bodyPr/>
-          <a:lstStyle/>
-          <a:p>
-            <a:endParaRPr lang="en-US" dirty="0"/>
-          </a:p>
-        </p:txBody>
-      </p:sp>
-      <p:sp>
-        <p:nvSpPr>
-          <p:cNvPr id="3" name="Content Placeholder 2">
-            <a:extLst>
-              <a:ext uri="{FF2B5EF4-FFF2-40B4-BE49-F238E27FC236}">
-                <a16:creationId xmlns:a16="http://schemas.microsoft.com/office/drawing/2014/main" id="{24DB9C6D-8C9B-5946-97F4-E59593FE7769}"/>
-              </a:ext>
-            </a:extLst>
-          </p:cNvPr>
-          <p:cNvSpPr>
-            <a:spLocks noGrp="1"/>
-          </p:cNvSpPr>
-          <p:nvPr>
-            <p:ph idx="1"/>
-          </p:nvPr>
-        </p:nvSpPr>
-        <p:spPr/>
-        <p:txBody>
-          <a:bodyPr/>
-          <a:lstStyle/>
-          <a:p>
-            <a:endParaRPr lang="en-US" dirty="0"/>
-          </a:p>
-        </p:txBody>
-      </p:sp>
-      <p:sp>
-        <p:nvSpPr>
-          <p:cNvPr id="4" name="Slide Number Placeholder 3">
-            <a:extLst>
-              <a:ext uri="{FF2B5EF4-FFF2-40B4-BE49-F238E27FC236}">
-                <a16:creationId xmlns:a16="http://schemas.microsoft.com/office/drawing/2014/main" id="{C223958E-9418-1F4F-9E0F-0AEFB0A73A80}"/>
-              </a:ext>
-            </a:extLst>
-          </p:cNvPr>
-          <p:cNvSpPr>
-            <a:spLocks noGrp="1"/>
-          </p:cNvSpPr>
-          <p:nvPr>
-            <p:ph type="sldNum" sz="quarter" idx="12"/>
-          </p:nvPr>
-        </p:nvSpPr>
-        <p:spPr/>
-        <p:txBody>
-          <a:bodyPr/>
-          <a:lstStyle/>
-          <a:p>
-            <a:fld id="{6D22F896-40B5-4ADD-8801-0D06FADFA095}" type="slidenum">
-              <a:rPr lang="en-US" smtClean="0"/>
-              <a:t>15</a:t>
-            </a:fld>
-            <a:endParaRPr lang="en-US" dirty="0"/>
-          </a:p>
-        </p:txBody>
-      </p:sp>
-    </p:spTree>
-    <p:extLst>
-      <p:ext uri="{BB962C8B-B14F-4D97-AF65-F5344CB8AC3E}">
-        <p14:creationId xmlns:p14="http://schemas.microsoft.com/office/powerpoint/2010/main" val="3985792162"/>
-      </p:ext>
-    </p:extLst>
-  </p:cSld>
-  <p:clrMapOvr>
-    <a:masterClrMapping/>
-  </p:clrMapOvr>
-</p:sld>
-</file>
-
-<file path=ppt/slides/slide16.xml><?xml version="1.0" encoding="utf-8"?>
+<file path=ppt/slides/slide17.xml><?xml version="1.0" encoding="utf-8"?>
 <p:sld xmlns:a="http://schemas.openxmlformats.org/drawingml/2006/main" xmlns:r="http://schemas.openxmlformats.org/officeDocument/2006/relationships" xmlns:p="http://schemas.openxmlformats.org/presentationml/2006/main">
   <p:cSld>
     <p:spTree>
@@ -17852,7 +18640,12 @@
             <p:ph type="title"/>
           </p:nvPr>
         </p:nvSpPr>
-        <p:spPr/>
+        <p:spPr>
+          <a:xfrm>
+            <a:off x="2611808" y="808057"/>
+            <a:ext cx="7958331" cy="655828"/>
+          </a:xfrm>
+        </p:spPr>
         <p:txBody>
           <a:bodyPr/>
           <a:lstStyle/>
@@ -17889,7 +18682,7 @@
         </p:blipFill>
         <p:spPr>
           <a:xfrm>
-            <a:off x="3937779" y="1554798"/>
+            <a:off x="3937777" y="1554798"/>
             <a:ext cx="5306387" cy="4541124"/>
           </a:xfrm>
         </p:spPr>
@@ -17953,7 +18746,7 @@
           <a:p>
             <a:fld id="{6D22F896-40B5-4ADD-8801-0D06FADFA095}" type="slidenum">
               <a:rPr lang="en-US" smtClean="0"/>
-              <a:t>16</a:t>
+              <a:t>17</a:t>
             </a:fld>
             <a:endParaRPr lang="en-US" dirty="0"/>
           </a:p>
@@ -17972,7 +18765,7 @@
 </p:sld>
 </file>
 
-<file path=ppt/slides/slide17.xml><?xml version="1.0" encoding="utf-8"?>
+<file path=ppt/slides/slide18.xml><?xml version="1.0" encoding="utf-8"?>
 <p:sld xmlns:a="http://schemas.openxmlformats.org/drawingml/2006/main" xmlns:r="http://schemas.openxmlformats.org/officeDocument/2006/relationships" xmlns:p="http://schemas.openxmlformats.org/presentationml/2006/main">
   <p:cSld>
     <p:spTree>
@@ -18016,10 +18809,7 @@
           <a:lstStyle/>
           <a:p>
             <a:pPr algn="l"/>
-            <a:r>
-              <a:rPr lang="en-US" dirty="0"/>
-              <a:t>Effect of Devices</a:t>
-            </a:r>
+            <a:endParaRPr lang="en-US" dirty="0"/>
           </a:p>
         </p:txBody>
       </p:sp>
@@ -18076,7 +18866,7 @@
           <a:p>
             <a:fld id="{6D22F896-40B5-4ADD-8801-0D06FADFA095}" type="slidenum">
               <a:rPr lang="en-US" smtClean="0"/>
-              <a:t>17</a:t>
+              <a:t>18</a:t>
             </a:fld>
             <a:endParaRPr lang="en-US" dirty="0"/>
           </a:p>
@@ -18095,7 +18885,7 @@
 </p:sld>
 </file>
 
-<file path=ppt/slides/slide18.xml><?xml version="1.0" encoding="utf-8"?>
+<file path=ppt/slides/slide19.xml><?xml version="1.0" encoding="utf-8"?>
 <p:sld xmlns:a="http://schemas.openxmlformats.org/drawingml/2006/main" xmlns:r="http://schemas.openxmlformats.org/officeDocument/2006/relationships" xmlns:p="http://schemas.openxmlformats.org/presentationml/2006/main">
   <p:cSld>
     <p:spTree>
@@ -18135,13 +18925,15 @@
           </a:xfrm>
         </p:spPr>
         <p:txBody>
-          <a:bodyPr/>
+          <a:bodyPr>
+            <a:normAutofit/>
+          </a:bodyPr>
           <a:lstStyle/>
           <a:p>
             <a:pPr algn="l"/>
             <a:r>
-              <a:rPr lang="en-US" dirty="0"/>
-              <a:t>Effects of Sample Sizes</a:t>
+              <a:rPr lang="en-US" sz="2800" dirty="0"/>
+              <a:t>How does the model perform for small datasets?</a:t>
             </a:r>
           </a:p>
         </p:txBody>
@@ -18198,7 +18990,7 @@
           <a:p>
             <a:fld id="{6D22F896-40B5-4ADD-8801-0D06FADFA095}" type="slidenum">
               <a:rPr lang="en-US" smtClean="0"/>
-              <a:t>18</a:t>
+              <a:t>19</a:t>
             </a:fld>
             <a:endParaRPr lang="en-US" dirty="0"/>
           </a:p>
@@ -18208,135 +19000,6 @@
     <p:extLst>
       <p:ext uri="{BB962C8B-B14F-4D97-AF65-F5344CB8AC3E}">
         <p14:creationId xmlns:p14="http://schemas.microsoft.com/office/powerpoint/2010/main" val="1850435212"/>
-      </p:ext>
-    </p:extLst>
-  </p:cSld>
-  <p:clrMapOvr>
-    <a:masterClrMapping/>
-  </p:clrMapOvr>
-</p:sld>
-</file>
-
-<file path=ppt/slides/slide19.xml><?xml version="1.0" encoding="utf-8"?>
-<p:sld xmlns:a="http://schemas.openxmlformats.org/drawingml/2006/main" xmlns:r="http://schemas.openxmlformats.org/officeDocument/2006/relationships" xmlns:p="http://schemas.openxmlformats.org/presentationml/2006/main">
-  <p:cSld>
-    <p:spTree>
-      <p:nvGrpSpPr>
-        <p:cNvPr id="1" name=""/>
-        <p:cNvGrpSpPr/>
-        <p:nvPr/>
-      </p:nvGrpSpPr>
-      <p:grpSpPr>
-        <a:xfrm>
-          <a:off x="0" y="0"/>
-          <a:ext cx="0" cy="0"/>
-          <a:chOff x="0" y="0"/>
-          <a:chExt cx="0" cy="0"/>
-        </a:xfrm>
-      </p:grpSpPr>
-      <p:sp>
-        <p:nvSpPr>
-          <p:cNvPr id="2" name="Title 1">
-            <a:extLst>
-              <a:ext uri="{FF2B5EF4-FFF2-40B4-BE49-F238E27FC236}">
-                <a16:creationId xmlns:a16="http://schemas.microsoft.com/office/drawing/2014/main" id="{C4B6F837-2A22-CD46-8852-7F204CC6A785}"/>
-              </a:ext>
-            </a:extLst>
-          </p:cNvPr>
-          <p:cNvSpPr>
-            <a:spLocks noGrp="1"/>
-          </p:cNvSpPr>
-          <p:nvPr>
-            <p:ph type="title"/>
-          </p:nvPr>
-        </p:nvSpPr>
-        <p:spPr/>
-        <p:txBody>
-          <a:bodyPr/>
-          <a:lstStyle/>
-          <a:p>
-            <a:endParaRPr lang="en-US"/>
-          </a:p>
-        </p:txBody>
-      </p:sp>
-      <p:sp>
-        <p:nvSpPr>
-          <p:cNvPr id="4" name="Slide Number Placeholder 3">
-            <a:extLst>
-              <a:ext uri="{FF2B5EF4-FFF2-40B4-BE49-F238E27FC236}">
-                <a16:creationId xmlns:a16="http://schemas.microsoft.com/office/drawing/2014/main" id="{6397FC56-9B20-C94C-94BE-7B15F36CD02E}"/>
-              </a:ext>
-            </a:extLst>
-          </p:cNvPr>
-          <p:cNvSpPr>
-            <a:spLocks noGrp="1"/>
-          </p:cNvSpPr>
-          <p:nvPr>
-            <p:ph type="sldNum" sz="quarter" idx="12"/>
-          </p:nvPr>
-        </p:nvSpPr>
-        <p:spPr/>
-        <p:txBody>
-          <a:bodyPr/>
-          <a:lstStyle/>
-          <a:p>
-            <a:fld id="{6D22F896-40B5-4ADD-8801-0D06FADFA095}" type="slidenum">
-              <a:rPr lang="en-US" smtClean="0"/>
-              <a:t>19</a:t>
-            </a:fld>
-            <a:endParaRPr lang="en-US" dirty="0"/>
-          </a:p>
-        </p:txBody>
-      </p:sp>
-      <p:pic>
-        <p:nvPicPr>
-          <p:cNvPr id="5" name="Content Placeholder 4">
-            <a:extLst>
-              <a:ext uri="{FF2B5EF4-FFF2-40B4-BE49-F238E27FC236}">
-                <a16:creationId xmlns:a16="http://schemas.microsoft.com/office/drawing/2014/main" id="{ACA7060D-792A-C549-AF44-B810A641DC8A}"/>
-              </a:ext>
-            </a:extLst>
-          </p:cNvPr>
-          <p:cNvPicPr>
-            <a:picLocks noGrp="1" noChangeAspect="1"/>
-          </p:cNvPicPr>
-          <p:nvPr>
-            <p:ph idx="1"/>
-          </p:nvPr>
-        </p:nvPicPr>
-        <p:blipFill>
-          <a:blip r:embed="rId2">
-            <a:alphaModFix/>
-            <a:extLst>
-              <a:ext uri="{BEBA8EAE-BF5A-486C-A8C5-ECC9F3942E4B}">
-                <a14:imgProps xmlns:a14="http://schemas.microsoft.com/office/drawing/2010/main">
-                  <a14:imgLayer r:embed="rId3">
-                    <a14:imgEffect>
-                      <a14:saturation sat="400000"/>
-                    </a14:imgEffect>
-                  </a14:imgLayer>
-                </a14:imgProps>
-              </a:ext>
-            </a:extLst>
-          </a:blip>
-          <a:stretch>
-            <a:fillRect/>
-          </a:stretch>
-        </p:blipFill>
-        <p:spPr>
-          <a:xfrm>
-            <a:off x="4646359" y="2052638"/>
-            <a:ext cx="4050219" cy="3997325"/>
-          </a:xfrm>
-          <a:prstGeom prst="rect">
-            <a:avLst/>
-          </a:prstGeom>
-        </p:spPr>
-      </p:pic>
-    </p:spTree>
-    <p:extLst>
-      <p:ext uri="{BB962C8B-B14F-4D97-AF65-F5344CB8AC3E}">
-        <p14:creationId xmlns:p14="http://schemas.microsoft.com/office/powerpoint/2010/main" val="1369419814"/>
       </p:ext>
     </p:extLst>
   </p:cSld>
@@ -18547,6 +19210,144 @@
           <p:cNvPr id="2" name="Title 1">
             <a:extLst>
               <a:ext uri="{FF2B5EF4-FFF2-40B4-BE49-F238E27FC236}">
+                <a16:creationId xmlns:a16="http://schemas.microsoft.com/office/drawing/2014/main" id="{C4B6F837-2A22-CD46-8852-7F204CC6A785}"/>
+              </a:ext>
+            </a:extLst>
+          </p:cNvPr>
+          <p:cNvSpPr>
+            <a:spLocks noGrp="1"/>
+          </p:cNvSpPr>
+          <p:nvPr>
+            <p:ph type="title"/>
+          </p:nvPr>
+        </p:nvSpPr>
+        <p:spPr>
+          <a:xfrm>
+            <a:off x="2611808" y="808057"/>
+            <a:ext cx="7958331" cy="665144"/>
+          </a:xfrm>
+        </p:spPr>
+        <p:txBody>
+          <a:bodyPr/>
+          <a:lstStyle/>
+          <a:p>
+            <a:pPr algn="l"/>
+            <a:r>
+              <a:rPr lang="en-US" dirty="0"/>
+              <a:t>How well did our placeholders perform?</a:t>
+            </a:r>
+          </a:p>
+        </p:txBody>
+      </p:sp>
+      <p:sp>
+        <p:nvSpPr>
+          <p:cNvPr id="4" name="Slide Number Placeholder 3">
+            <a:extLst>
+              <a:ext uri="{FF2B5EF4-FFF2-40B4-BE49-F238E27FC236}">
+                <a16:creationId xmlns:a16="http://schemas.microsoft.com/office/drawing/2014/main" id="{6397FC56-9B20-C94C-94BE-7B15F36CD02E}"/>
+              </a:ext>
+            </a:extLst>
+          </p:cNvPr>
+          <p:cNvSpPr>
+            <a:spLocks noGrp="1"/>
+          </p:cNvSpPr>
+          <p:nvPr>
+            <p:ph type="sldNum" sz="quarter" idx="12"/>
+          </p:nvPr>
+        </p:nvSpPr>
+        <p:spPr/>
+        <p:txBody>
+          <a:bodyPr/>
+          <a:lstStyle/>
+          <a:p>
+            <a:fld id="{6D22F896-40B5-4ADD-8801-0D06FADFA095}" type="slidenum">
+              <a:rPr lang="en-US" smtClean="0"/>
+              <a:t>20</a:t>
+            </a:fld>
+            <a:endParaRPr lang="en-US" dirty="0"/>
+          </a:p>
+        </p:txBody>
+      </p:sp>
+      <p:pic>
+        <p:nvPicPr>
+          <p:cNvPr id="5" name="Content Placeholder 4">
+            <a:extLst>
+              <a:ext uri="{FF2B5EF4-FFF2-40B4-BE49-F238E27FC236}">
+                <a16:creationId xmlns:a16="http://schemas.microsoft.com/office/drawing/2014/main" id="{ACA7060D-792A-C549-AF44-B810A641DC8A}"/>
+              </a:ext>
+            </a:extLst>
+          </p:cNvPr>
+          <p:cNvPicPr>
+            <a:picLocks noGrp="1" noChangeAspect="1"/>
+          </p:cNvPicPr>
+          <p:nvPr>
+            <p:ph idx="1"/>
+          </p:nvPr>
+        </p:nvPicPr>
+        <p:blipFill>
+          <a:blip r:embed="rId2">
+            <a:alphaModFix/>
+            <a:extLst>
+              <a:ext uri="{BEBA8EAE-BF5A-486C-A8C5-ECC9F3942E4B}">
+                <a14:imgProps xmlns:a14="http://schemas.microsoft.com/office/drawing/2010/main">
+                  <a14:imgLayer r:embed="rId3">
+                    <a14:imgEffect>
+                      <a14:saturation sat="400000"/>
+                    </a14:imgEffect>
+                  </a14:imgLayer>
+                </a14:imgProps>
+              </a:ext>
+            </a:extLst>
+          </a:blip>
+          <a:stretch>
+            <a:fillRect/>
+          </a:stretch>
+        </p:blipFill>
+        <p:spPr>
+          <a:xfrm>
+            <a:off x="4328859" y="2065338"/>
+            <a:ext cx="4050219" cy="3997325"/>
+          </a:xfrm>
+          <a:prstGeom prst="rect">
+            <a:avLst/>
+          </a:prstGeom>
+        </p:spPr>
+      </p:pic>
+    </p:spTree>
+    <p:extLst>
+      <p:ext uri="{BB962C8B-B14F-4D97-AF65-F5344CB8AC3E}">
+        <p14:creationId xmlns:p14="http://schemas.microsoft.com/office/powerpoint/2010/main" val="1369419814"/>
+      </p:ext>
+    </p:extLst>
+  </p:cSld>
+  <p:clrMapOvr>
+    <a:masterClrMapping/>
+  </p:clrMapOvr>
+</p:sld>
+</file>
+
+<file path=ppt/slides/slide21.xml><?xml version="1.0" encoding="utf-8"?>
+<p:sld xmlns:a="http://schemas.openxmlformats.org/drawingml/2006/main" xmlns:r="http://schemas.openxmlformats.org/officeDocument/2006/relationships" xmlns:p="http://schemas.openxmlformats.org/presentationml/2006/main">
+  <p:cSld>
+    <p:spTree>
+      <p:nvGrpSpPr>
+        <p:cNvPr id="1" name=""/>
+        <p:cNvGrpSpPr/>
+        <p:nvPr/>
+      </p:nvGrpSpPr>
+      <p:grpSpPr>
+        <a:xfrm>
+          <a:off x="0" y="0"/>
+          <a:ext cx="0" cy="0"/>
+          <a:chOff x="0" y="0"/>
+          <a:chExt cx="0" cy="0"/>
+        </a:xfrm>
+      </p:grpSpPr>
+      <p:sp>
+        <p:nvSpPr>
+          <p:cNvPr id="2" name="Title 1">
+            <a:extLst>
+              <a:ext uri="{FF2B5EF4-FFF2-40B4-BE49-F238E27FC236}">
                 <a16:creationId xmlns:a16="http://schemas.microsoft.com/office/drawing/2014/main" id="{6BF7367E-C58E-314F-AC38-D59BF03DF787}"/>
               </a:ext>
             </a:extLst>
@@ -18589,35 +19390,37 @@
         </p:nvSpPr>
         <p:spPr>
           <a:xfrm>
-            <a:off x="2611808" y="1982542"/>
-            <a:ext cx="7796540" cy="3997828"/>
+            <a:off x="2073927" y="1890970"/>
+            <a:ext cx="9034092" cy="3997828"/>
           </a:xfrm>
         </p:spPr>
         <p:txBody>
-          <a:bodyPr anchor="t"/>
+          <a:bodyPr anchor="t">
+            <a:normAutofit/>
+          </a:bodyPr>
           <a:lstStyle/>
           <a:p>
             <a:r>
-              <a:rPr lang="en-US" dirty="0"/>
+              <a:rPr lang="en-US" sz="2400" dirty="0"/>
               <a:t>Evaluate our model against the current state of the art: tab-completion in CLIs on modern routers</a:t>
             </a:r>
           </a:p>
           <a:p>
             <a:r>
-              <a:rPr lang="en-US" dirty="0"/>
+              <a:rPr lang="en-US" sz="2400" dirty="0"/>
               <a:t>Using larger n-grams to suggest complete statements</a:t>
             </a:r>
           </a:p>
           <a:p>
             <a:r>
-              <a:rPr lang="en-US" dirty="0"/>
+              <a:rPr lang="en-US" sz="2400" dirty="0"/>
               <a:t>Completing entire lines or even stanzas</a:t>
             </a:r>
           </a:p>
           <a:p>
             <a:r>
-              <a:rPr lang="en-US" dirty="0"/>
-              <a:t>Not just based on syntax but also desired goals using input from operators	</a:t>
+              <a:rPr lang="en-US" sz="2400" dirty="0"/>
+              <a:t>Not just based on syntax but also desired goals using input from operators</a:t>
             </a:r>
           </a:p>
         </p:txBody>
@@ -18645,7 +19448,7 @@
           <a:p>
             <a:fld id="{6D22F896-40B5-4ADD-8801-0D06FADFA095}" type="slidenum">
               <a:rPr lang="en-US" smtClean="0"/>
-              <a:t>20</a:t>
+              <a:t>21</a:t>
             </a:fld>
             <a:endParaRPr lang="en-US" dirty="0"/>
           </a:p>
@@ -18664,7 +19467,7 @@
 </p:sld>
 </file>
 
-<file path=ppt/slides/slide21.xml><?xml version="1.0" encoding="utf-8"?>
+<file path=ppt/slides/slide22.xml><?xml version="1.0" encoding="utf-8"?>
 <p:sld xmlns:a="http://schemas.openxmlformats.org/drawingml/2006/main" xmlns:r="http://schemas.openxmlformats.org/officeDocument/2006/relationships" xmlns:p="http://schemas.openxmlformats.org/presentationml/2006/main">
   <p:cSld>
     <p:spTree>
@@ -18758,7 +19561,7 @@
           <a:p>
             <a:fld id="{6D22F896-40B5-4ADD-8801-0D06FADFA095}" type="slidenum">
               <a:rPr lang="en-US" smtClean="0"/>
-              <a:t>21</a:t>
+              <a:t>22</a:t>
             </a:fld>
             <a:endParaRPr lang="en-US" dirty="0"/>
           </a:p>
@@ -18777,7 +19580,7 @@
 </p:sld>
 </file>
 
-<file path=ppt/slides/slide22.xml><?xml version="1.0" encoding="utf-8"?>
+<file path=ppt/slides/slide23.xml><?xml version="1.0" encoding="utf-8"?>
 <p:sld xmlns:a="http://schemas.openxmlformats.org/drawingml/2006/main" xmlns:r="http://schemas.openxmlformats.org/officeDocument/2006/relationships" xmlns:p="http://schemas.openxmlformats.org/presentationml/2006/main">
   <p:cSld>
     <p:spTree>
@@ -18877,7 +19680,7 @@
           <a:p>
             <a:fld id="{6D22F896-40B5-4ADD-8801-0D06FADFA095}" type="slidenum">
               <a:rPr lang="en-US" smtClean="0"/>
-              <a:t>22</a:t>
+              <a:t>23</a:t>
             </a:fld>
             <a:endParaRPr lang="en-US" dirty="0"/>
           </a:p>
@@ -19264,13 +20067,13 @@
             <p:ph idx="1"/>
             <p:extLst>
               <p:ext uri="{D42A27DB-BD31-4B8C-83A1-F6EECF244321}">
-                <p14:modId xmlns:p14="http://schemas.microsoft.com/office/powerpoint/2010/main" val="3709288483"/>
+                <p14:modId xmlns:p14="http://schemas.microsoft.com/office/powerpoint/2010/main" val="3701375251"/>
               </p:ext>
             </p:extLst>
           </p:nvPr>
         </p:nvGraphicFramePr>
         <p:xfrm>
-          <a:off x="2773363" y="2052638"/>
+          <a:off x="2611808" y="1671638"/>
           <a:ext cx="7796212" cy="3997325"/>
         </p:xfrm>
         <a:graphic>
@@ -19308,6 +20111,659 @@
           </a:p>
         </p:txBody>
       </p:sp>
+      <p:grpSp>
+        <p:nvGrpSpPr>
+          <p:cNvPr id="7" name="Group 6">
+            <a:extLst>
+              <a:ext uri="{FF2B5EF4-FFF2-40B4-BE49-F238E27FC236}">
+                <a16:creationId xmlns:a16="http://schemas.microsoft.com/office/drawing/2014/main" id="{FF081E54-EB0A-B649-B620-1AA03BF738A5}"/>
+              </a:ext>
+            </a:extLst>
+          </p:cNvPr>
+          <p:cNvGrpSpPr/>
+          <p:nvPr/>
+        </p:nvGrpSpPr>
+        <p:grpSpPr>
+          <a:xfrm>
+            <a:off x="5472454" y="4258731"/>
+            <a:ext cx="2094994" cy="2273814"/>
+            <a:chOff x="5582813" y="4247964"/>
+            <a:chExt cx="2094994" cy="2359215"/>
+          </a:xfrm>
+        </p:grpSpPr>
+        <p:sp>
+          <p:nvSpPr>
+            <p:cNvPr id="8" name="Freeform 7">
+              <a:extLst>
+                <a:ext uri="{FF2B5EF4-FFF2-40B4-BE49-F238E27FC236}">
+                  <a16:creationId xmlns:a16="http://schemas.microsoft.com/office/drawing/2014/main" id="{A5A23F66-6C11-4A41-B25F-935A5A43273E}"/>
+                </a:ext>
+              </a:extLst>
+            </p:cNvPr>
+            <p:cNvSpPr/>
+            <p:nvPr/>
+          </p:nvSpPr>
+          <p:spPr>
+            <a:xfrm>
+              <a:off x="5582813" y="4247964"/>
+              <a:ext cx="1425624" cy="712812"/>
+            </a:xfrm>
+            <a:custGeom>
+              <a:avLst/>
+              <a:gdLst>
+                <a:gd name="connsiteX0" fmla="*/ 0 w 1425624"/>
+                <a:gd name="connsiteY0" fmla="*/ 71281 h 712812"/>
+                <a:gd name="connsiteX1" fmla="*/ 71281 w 1425624"/>
+                <a:gd name="connsiteY1" fmla="*/ 0 h 712812"/>
+                <a:gd name="connsiteX2" fmla="*/ 1354343 w 1425624"/>
+                <a:gd name="connsiteY2" fmla="*/ 0 h 712812"/>
+                <a:gd name="connsiteX3" fmla="*/ 1425624 w 1425624"/>
+                <a:gd name="connsiteY3" fmla="*/ 71281 h 712812"/>
+                <a:gd name="connsiteX4" fmla="*/ 1425624 w 1425624"/>
+                <a:gd name="connsiteY4" fmla="*/ 641531 h 712812"/>
+                <a:gd name="connsiteX5" fmla="*/ 1354343 w 1425624"/>
+                <a:gd name="connsiteY5" fmla="*/ 712812 h 712812"/>
+                <a:gd name="connsiteX6" fmla="*/ 71281 w 1425624"/>
+                <a:gd name="connsiteY6" fmla="*/ 712812 h 712812"/>
+                <a:gd name="connsiteX7" fmla="*/ 0 w 1425624"/>
+                <a:gd name="connsiteY7" fmla="*/ 641531 h 712812"/>
+                <a:gd name="connsiteX8" fmla="*/ 0 w 1425624"/>
+                <a:gd name="connsiteY8" fmla="*/ 71281 h 712812"/>
+              </a:gdLst>
+              <a:ahLst/>
+              <a:cxnLst>
+                <a:cxn ang="0">
+                  <a:pos x="connsiteX0" y="connsiteY0"/>
+                </a:cxn>
+                <a:cxn ang="0">
+                  <a:pos x="connsiteX1" y="connsiteY1"/>
+                </a:cxn>
+                <a:cxn ang="0">
+                  <a:pos x="connsiteX2" y="connsiteY2"/>
+                </a:cxn>
+                <a:cxn ang="0">
+                  <a:pos x="connsiteX3" y="connsiteY3"/>
+                </a:cxn>
+                <a:cxn ang="0">
+                  <a:pos x="connsiteX4" y="connsiteY4"/>
+                </a:cxn>
+                <a:cxn ang="0">
+                  <a:pos x="connsiteX5" y="connsiteY5"/>
+                </a:cxn>
+                <a:cxn ang="0">
+                  <a:pos x="connsiteX6" y="connsiteY6"/>
+                </a:cxn>
+                <a:cxn ang="0">
+                  <a:pos x="connsiteX7" y="connsiteY7"/>
+                </a:cxn>
+                <a:cxn ang="0">
+                  <a:pos x="connsiteX8" y="connsiteY8"/>
+                </a:cxn>
+              </a:cxnLst>
+              <a:rect l="l" t="t" r="r" b="b"/>
+              <a:pathLst>
+                <a:path w="1425624" h="712812">
+                  <a:moveTo>
+                    <a:pt x="0" y="71281"/>
+                  </a:moveTo>
+                  <a:cubicBezTo>
+                    <a:pt x="0" y="31914"/>
+                    <a:pt x="31914" y="0"/>
+                    <a:pt x="71281" y="0"/>
+                  </a:cubicBezTo>
+                  <a:lnTo>
+                    <a:pt x="1354343" y="0"/>
+                  </a:lnTo>
+                  <a:cubicBezTo>
+                    <a:pt x="1393710" y="0"/>
+                    <a:pt x="1425624" y="31914"/>
+                    <a:pt x="1425624" y="71281"/>
+                  </a:cubicBezTo>
+                  <a:lnTo>
+                    <a:pt x="1425624" y="641531"/>
+                  </a:lnTo>
+                  <a:cubicBezTo>
+                    <a:pt x="1425624" y="680898"/>
+                    <a:pt x="1393710" y="712812"/>
+                    <a:pt x="1354343" y="712812"/>
+                  </a:cubicBezTo>
+                  <a:lnTo>
+                    <a:pt x="71281" y="712812"/>
+                  </a:lnTo>
+                  <a:cubicBezTo>
+                    <a:pt x="31914" y="712812"/>
+                    <a:pt x="0" y="680898"/>
+                    <a:pt x="0" y="641531"/>
+                  </a:cubicBezTo>
+                  <a:lnTo>
+                    <a:pt x="0" y="71281"/>
+                  </a:lnTo>
+                  <a:close/>
+                </a:path>
+              </a:pathLst>
+            </a:custGeom>
+            <a:noFill/>
+            <a:ln>
+              <a:noFill/>
+            </a:ln>
+          </p:spPr>
+          <p:style>
+            <a:lnRef idx="2">
+              <a:scrgbClr r="0" g="0" b="0"/>
+            </a:lnRef>
+            <a:fillRef idx="1">
+              <a:scrgbClr r="0" g="0" b="0"/>
+            </a:fillRef>
+            <a:effectRef idx="0">
+              <a:schemeClr val="accent1">
+                <a:hueOff val="0"/>
+                <a:satOff val="0"/>
+                <a:lumOff val="0"/>
+                <a:alphaOff val="0"/>
+              </a:schemeClr>
+            </a:effectRef>
+            <a:fontRef idx="minor">
+              <a:schemeClr val="lt1"/>
+            </a:fontRef>
+          </p:style>
+          <p:txBody>
+            <a:bodyPr spcFirstLastPara="0" vert="horz" wrap="square" lIns="97078" tIns="71678" rIns="97078" bIns="71678" numCol="1" spcCol="1270" anchor="ctr" anchorCtr="0">
+              <a:noAutofit/>
+            </a:bodyPr>
+            <a:lstStyle/>
+            <a:p>
+              <a:pPr marL="0" lvl="0" indent="0" algn="ctr" defTabSz="1778000">
+                <a:lnSpc>
+                  <a:spcPct val="90000"/>
+                </a:lnSpc>
+                <a:spcBef>
+                  <a:spcPct val="0"/>
+                </a:spcBef>
+                <a:spcAft>
+                  <a:spcPct val="35000"/>
+                </a:spcAft>
+                <a:buNone/>
+              </a:pPr>
+              <a:endParaRPr lang="en-US" sz="4000" kern="1200" dirty="0"/>
+            </a:p>
+          </p:txBody>
+        </p:sp>
+        <p:sp>
+          <p:nvSpPr>
+            <p:cNvPr id="9" name="Freeform 8">
+              <a:extLst>
+                <a:ext uri="{FF2B5EF4-FFF2-40B4-BE49-F238E27FC236}">
+                  <a16:creationId xmlns:a16="http://schemas.microsoft.com/office/drawing/2014/main" id="{D030C763-BED6-9C49-9102-F222725B607B}"/>
+                </a:ext>
+              </a:extLst>
+            </p:cNvPr>
+            <p:cNvSpPr/>
+            <p:nvPr/>
+          </p:nvSpPr>
+          <p:spPr>
+            <a:xfrm>
+              <a:off x="5725375" y="4960777"/>
+              <a:ext cx="142562" cy="534609"/>
+            </a:xfrm>
+            <a:custGeom>
+              <a:avLst/>
+              <a:gdLst/>
+              <a:ahLst/>
+              <a:cxnLst/>
+              <a:rect l="0" t="0" r="0" b="0"/>
+              <a:pathLst>
+                <a:path>
+                  <a:moveTo>
+                    <a:pt x="0" y="0"/>
+                  </a:moveTo>
+                  <a:lnTo>
+                    <a:pt x="0" y="534609"/>
+                  </a:lnTo>
+                  <a:lnTo>
+                    <a:pt x="142562" y="534609"/>
+                  </a:lnTo>
+                </a:path>
+              </a:pathLst>
+            </a:custGeom>
+            <a:noFill/>
+          </p:spPr>
+          <p:style>
+            <a:lnRef idx="2">
+              <a:schemeClr val="accent1">
+                <a:shade val="60000"/>
+                <a:hueOff val="0"/>
+                <a:satOff val="0"/>
+                <a:lumOff val="0"/>
+                <a:alphaOff val="0"/>
+              </a:schemeClr>
+            </a:lnRef>
+            <a:fillRef idx="0">
+              <a:scrgbClr r="0" g="0" b="0"/>
+            </a:fillRef>
+            <a:effectRef idx="0">
+              <a:schemeClr val="accent1">
+                <a:hueOff val="0"/>
+                <a:satOff val="0"/>
+                <a:lumOff val="0"/>
+                <a:alphaOff val="0"/>
+              </a:schemeClr>
+            </a:effectRef>
+            <a:fontRef idx="minor">
+              <a:schemeClr val="tx1">
+                <a:hueOff val="0"/>
+                <a:satOff val="0"/>
+                <a:lumOff val="0"/>
+                <a:alphaOff val="0"/>
+              </a:schemeClr>
+            </a:fontRef>
+          </p:style>
+        </p:sp>
+        <p:sp>
+          <p:nvSpPr>
+            <p:cNvPr id="10" name="Freeform 9">
+              <a:extLst>
+                <a:ext uri="{FF2B5EF4-FFF2-40B4-BE49-F238E27FC236}">
+                  <a16:creationId xmlns:a16="http://schemas.microsoft.com/office/drawing/2014/main" id="{5D7A91FC-CCAF-E148-B9A9-8BEE975178AB}"/>
+                </a:ext>
+              </a:extLst>
+            </p:cNvPr>
+            <p:cNvSpPr/>
+            <p:nvPr/>
+          </p:nvSpPr>
+          <p:spPr>
+            <a:xfrm>
+              <a:off x="5867938" y="5214178"/>
+              <a:ext cx="1809869" cy="634715"/>
+            </a:xfrm>
+            <a:custGeom>
+              <a:avLst/>
+              <a:gdLst>
+                <a:gd name="connsiteX0" fmla="*/ 0 w 1140499"/>
+                <a:gd name="connsiteY0" fmla="*/ 71281 h 712812"/>
+                <a:gd name="connsiteX1" fmla="*/ 71281 w 1140499"/>
+                <a:gd name="connsiteY1" fmla="*/ 0 h 712812"/>
+                <a:gd name="connsiteX2" fmla="*/ 1069218 w 1140499"/>
+                <a:gd name="connsiteY2" fmla="*/ 0 h 712812"/>
+                <a:gd name="connsiteX3" fmla="*/ 1140499 w 1140499"/>
+                <a:gd name="connsiteY3" fmla="*/ 71281 h 712812"/>
+                <a:gd name="connsiteX4" fmla="*/ 1140499 w 1140499"/>
+                <a:gd name="connsiteY4" fmla="*/ 641531 h 712812"/>
+                <a:gd name="connsiteX5" fmla="*/ 1069218 w 1140499"/>
+                <a:gd name="connsiteY5" fmla="*/ 712812 h 712812"/>
+                <a:gd name="connsiteX6" fmla="*/ 71281 w 1140499"/>
+                <a:gd name="connsiteY6" fmla="*/ 712812 h 712812"/>
+                <a:gd name="connsiteX7" fmla="*/ 0 w 1140499"/>
+                <a:gd name="connsiteY7" fmla="*/ 641531 h 712812"/>
+                <a:gd name="connsiteX8" fmla="*/ 0 w 1140499"/>
+                <a:gd name="connsiteY8" fmla="*/ 71281 h 712812"/>
+              </a:gdLst>
+              <a:ahLst/>
+              <a:cxnLst>
+                <a:cxn ang="0">
+                  <a:pos x="connsiteX0" y="connsiteY0"/>
+                </a:cxn>
+                <a:cxn ang="0">
+                  <a:pos x="connsiteX1" y="connsiteY1"/>
+                </a:cxn>
+                <a:cxn ang="0">
+                  <a:pos x="connsiteX2" y="connsiteY2"/>
+                </a:cxn>
+                <a:cxn ang="0">
+                  <a:pos x="connsiteX3" y="connsiteY3"/>
+                </a:cxn>
+                <a:cxn ang="0">
+                  <a:pos x="connsiteX4" y="connsiteY4"/>
+                </a:cxn>
+                <a:cxn ang="0">
+                  <a:pos x="connsiteX5" y="connsiteY5"/>
+                </a:cxn>
+                <a:cxn ang="0">
+                  <a:pos x="connsiteX6" y="connsiteY6"/>
+                </a:cxn>
+                <a:cxn ang="0">
+                  <a:pos x="connsiteX7" y="connsiteY7"/>
+                </a:cxn>
+                <a:cxn ang="0">
+                  <a:pos x="connsiteX8" y="connsiteY8"/>
+                </a:cxn>
+              </a:cxnLst>
+              <a:rect l="l" t="t" r="r" b="b"/>
+              <a:pathLst>
+                <a:path w="1140499" h="712812">
+                  <a:moveTo>
+                    <a:pt x="0" y="71281"/>
+                  </a:moveTo>
+                  <a:cubicBezTo>
+                    <a:pt x="0" y="31914"/>
+                    <a:pt x="31914" y="0"/>
+                    <a:pt x="71281" y="0"/>
+                  </a:cubicBezTo>
+                  <a:lnTo>
+                    <a:pt x="1069218" y="0"/>
+                  </a:lnTo>
+                  <a:cubicBezTo>
+                    <a:pt x="1108585" y="0"/>
+                    <a:pt x="1140499" y="31914"/>
+                    <a:pt x="1140499" y="71281"/>
+                  </a:cubicBezTo>
+                  <a:lnTo>
+                    <a:pt x="1140499" y="641531"/>
+                  </a:lnTo>
+                  <a:cubicBezTo>
+                    <a:pt x="1140499" y="680898"/>
+                    <a:pt x="1108585" y="712812"/>
+                    <a:pt x="1069218" y="712812"/>
+                  </a:cubicBezTo>
+                  <a:lnTo>
+                    <a:pt x="71281" y="712812"/>
+                  </a:lnTo>
+                  <a:cubicBezTo>
+                    <a:pt x="31914" y="712812"/>
+                    <a:pt x="0" y="680898"/>
+                    <a:pt x="0" y="641531"/>
+                  </a:cubicBezTo>
+                  <a:lnTo>
+                    <a:pt x="0" y="71281"/>
+                  </a:lnTo>
+                  <a:close/>
+                </a:path>
+              </a:pathLst>
+            </a:custGeom>
+          </p:spPr>
+          <p:style>
+            <a:lnRef idx="1">
+              <a:schemeClr val="accent1"/>
+            </a:lnRef>
+            <a:fillRef idx="3">
+              <a:schemeClr val="accent1"/>
+            </a:fillRef>
+            <a:effectRef idx="2">
+              <a:schemeClr val="accent1"/>
+            </a:effectRef>
+            <a:fontRef idx="minor">
+              <a:schemeClr val="dk1">
+                <a:hueOff val="0"/>
+                <a:satOff val="0"/>
+                <a:lumOff val="0"/>
+                <a:alphaOff val="0"/>
+              </a:schemeClr>
+            </a:fontRef>
+          </p:style>
+          <p:txBody>
+            <a:bodyPr spcFirstLastPara="0" vert="horz" wrap="square" lIns="53263" tIns="42468" rIns="53263" bIns="42468" numCol="1" spcCol="1270" anchor="ctr" anchorCtr="0">
+              <a:noAutofit/>
+            </a:bodyPr>
+            <a:lstStyle/>
+            <a:p>
+              <a:pPr algn="ctr" defTabSz="755650">
+                <a:lnSpc>
+                  <a:spcPct val="90000"/>
+                </a:lnSpc>
+                <a:spcBef>
+                  <a:spcPct val="0"/>
+                </a:spcBef>
+                <a:spcAft>
+                  <a:spcPct val="35000"/>
+                </a:spcAft>
+              </a:pPr>
+              <a:r>
+                <a:rPr lang="en-US" sz="1700" dirty="0">
+                  <a:ln w="0"/>
+                  <a:solidFill>
+                    <a:schemeClr val="tx1"/>
+                  </a:solidFill>
+                  <a:effectLst>
+                    <a:outerShdw blurRad="38100" dist="19050" dir="2700000" algn="tl" rotWithShape="0">
+                      <a:schemeClr val="dk1">
+                        <a:alpha val="40000"/>
+                      </a:schemeClr>
+                    </a:outerShdw>
+                  </a:effectLst>
+                </a:rPr>
+                <a:t>Command Line Interfaces</a:t>
+              </a:r>
+            </a:p>
+          </p:txBody>
+        </p:sp>
+        <p:sp>
+          <p:nvSpPr>
+            <p:cNvPr id="11" name="Freeform 10">
+              <a:extLst>
+                <a:ext uri="{FF2B5EF4-FFF2-40B4-BE49-F238E27FC236}">
+                  <a16:creationId xmlns:a16="http://schemas.microsoft.com/office/drawing/2014/main" id="{92998356-2845-8040-B7CF-9001E9A5B631}"/>
+                </a:ext>
+              </a:extLst>
+            </p:cNvPr>
+            <p:cNvSpPr/>
+            <p:nvPr/>
+          </p:nvSpPr>
+          <p:spPr>
+            <a:xfrm>
+              <a:off x="5725375" y="4960777"/>
+              <a:ext cx="142562" cy="1425624"/>
+            </a:xfrm>
+            <a:custGeom>
+              <a:avLst/>
+              <a:gdLst/>
+              <a:ahLst/>
+              <a:cxnLst/>
+              <a:rect l="0" t="0" r="0" b="0"/>
+              <a:pathLst>
+                <a:path>
+                  <a:moveTo>
+                    <a:pt x="0" y="0"/>
+                  </a:moveTo>
+                  <a:lnTo>
+                    <a:pt x="0" y="1425624"/>
+                  </a:lnTo>
+                  <a:lnTo>
+                    <a:pt x="142562" y="1425624"/>
+                  </a:lnTo>
+                </a:path>
+              </a:pathLst>
+            </a:custGeom>
+            <a:noFill/>
+          </p:spPr>
+          <p:style>
+            <a:lnRef idx="2">
+              <a:schemeClr val="accent1">
+                <a:shade val="60000"/>
+                <a:hueOff val="0"/>
+                <a:satOff val="0"/>
+                <a:lumOff val="0"/>
+                <a:alphaOff val="0"/>
+              </a:schemeClr>
+            </a:lnRef>
+            <a:fillRef idx="0">
+              <a:scrgbClr r="0" g="0" b="0"/>
+            </a:fillRef>
+            <a:effectRef idx="0">
+              <a:schemeClr val="accent1">
+                <a:hueOff val="0"/>
+                <a:satOff val="0"/>
+                <a:lumOff val="0"/>
+                <a:alphaOff val="0"/>
+              </a:schemeClr>
+            </a:effectRef>
+            <a:fontRef idx="minor">
+              <a:schemeClr val="tx1">
+                <a:hueOff val="0"/>
+                <a:satOff val="0"/>
+                <a:lumOff val="0"/>
+                <a:alphaOff val="0"/>
+              </a:schemeClr>
+            </a:fontRef>
+          </p:style>
+        </p:sp>
+        <p:sp>
+          <p:nvSpPr>
+            <p:cNvPr id="12" name="Freeform 11">
+              <a:extLst>
+                <a:ext uri="{FF2B5EF4-FFF2-40B4-BE49-F238E27FC236}">
+                  <a16:creationId xmlns:a16="http://schemas.microsoft.com/office/drawing/2014/main" id="{AB9EB7C0-9CA4-D342-A73C-EC24E59B8EA1}"/>
+                </a:ext>
+              </a:extLst>
+            </p:cNvPr>
+            <p:cNvSpPr/>
+            <p:nvPr/>
+          </p:nvSpPr>
+          <p:spPr>
+            <a:xfrm>
+              <a:off x="5867938" y="6029997"/>
+              <a:ext cx="1809869" cy="577182"/>
+            </a:xfrm>
+            <a:custGeom>
+              <a:avLst/>
+              <a:gdLst>
+                <a:gd name="connsiteX0" fmla="*/ 0 w 1569076"/>
+                <a:gd name="connsiteY0" fmla="*/ 71281 h 712812"/>
+                <a:gd name="connsiteX1" fmla="*/ 71281 w 1569076"/>
+                <a:gd name="connsiteY1" fmla="*/ 0 h 712812"/>
+                <a:gd name="connsiteX2" fmla="*/ 1497795 w 1569076"/>
+                <a:gd name="connsiteY2" fmla="*/ 0 h 712812"/>
+                <a:gd name="connsiteX3" fmla="*/ 1569076 w 1569076"/>
+                <a:gd name="connsiteY3" fmla="*/ 71281 h 712812"/>
+                <a:gd name="connsiteX4" fmla="*/ 1569076 w 1569076"/>
+                <a:gd name="connsiteY4" fmla="*/ 641531 h 712812"/>
+                <a:gd name="connsiteX5" fmla="*/ 1497795 w 1569076"/>
+                <a:gd name="connsiteY5" fmla="*/ 712812 h 712812"/>
+                <a:gd name="connsiteX6" fmla="*/ 71281 w 1569076"/>
+                <a:gd name="connsiteY6" fmla="*/ 712812 h 712812"/>
+                <a:gd name="connsiteX7" fmla="*/ 0 w 1569076"/>
+                <a:gd name="connsiteY7" fmla="*/ 641531 h 712812"/>
+                <a:gd name="connsiteX8" fmla="*/ 0 w 1569076"/>
+                <a:gd name="connsiteY8" fmla="*/ 71281 h 712812"/>
+              </a:gdLst>
+              <a:ahLst/>
+              <a:cxnLst>
+                <a:cxn ang="0">
+                  <a:pos x="connsiteX0" y="connsiteY0"/>
+                </a:cxn>
+                <a:cxn ang="0">
+                  <a:pos x="connsiteX1" y="connsiteY1"/>
+                </a:cxn>
+                <a:cxn ang="0">
+                  <a:pos x="connsiteX2" y="connsiteY2"/>
+                </a:cxn>
+                <a:cxn ang="0">
+                  <a:pos x="connsiteX3" y="connsiteY3"/>
+                </a:cxn>
+                <a:cxn ang="0">
+                  <a:pos x="connsiteX4" y="connsiteY4"/>
+                </a:cxn>
+                <a:cxn ang="0">
+                  <a:pos x="connsiteX5" y="connsiteY5"/>
+                </a:cxn>
+                <a:cxn ang="0">
+                  <a:pos x="connsiteX6" y="connsiteY6"/>
+                </a:cxn>
+                <a:cxn ang="0">
+                  <a:pos x="connsiteX7" y="connsiteY7"/>
+                </a:cxn>
+                <a:cxn ang="0">
+                  <a:pos x="connsiteX8" y="connsiteY8"/>
+                </a:cxn>
+              </a:cxnLst>
+              <a:rect l="l" t="t" r="r" b="b"/>
+              <a:pathLst>
+                <a:path w="1569076" h="712812">
+                  <a:moveTo>
+                    <a:pt x="0" y="71281"/>
+                  </a:moveTo>
+                  <a:cubicBezTo>
+                    <a:pt x="0" y="31914"/>
+                    <a:pt x="31914" y="0"/>
+                    <a:pt x="71281" y="0"/>
+                  </a:cubicBezTo>
+                  <a:lnTo>
+                    <a:pt x="1497795" y="0"/>
+                  </a:lnTo>
+                  <a:cubicBezTo>
+                    <a:pt x="1537162" y="0"/>
+                    <a:pt x="1569076" y="31914"/>
+                    <a:pt x="1569076" y="71281"/>
+                  </a:cubicBezTo>
+                  <a:lnTo>
+                    <a:pt x="1569076" y="641531"/>
+                  </a:lnTo>
+                  <a:cubicBezTo>
+                    <a:pt x="1569076" y="680898"/>
+                    <a:pt x="1537162" y="712812"/>
+                    <a:pt x="1497795" y="712812"/>
+                  </a:cubicBezTo>
+                  <a:lnTo>
+                    <a:pt x="71281" y="712812"/>
+                  </a:lnTo>
+                  <a:cubicBezTo>
+                    <a:pt x="31914" y="712812"/>
+                    <a:pt x="0" y="680898"/>
+                    <a:pt x="0" y="641531"/>
+                  </a:cubicBezTo>
+                  <a:lnTo>
+                    <a:pt x="0" y="71281"/>
+                  </a:lnTo>
+                  <a:close/>
+                </a:path>
+              </a:pathLst>
+            </a:custGeom>
+          </p:spPr>
+          <p:style>
+            <a:lnRef idx="1">
+              <a:schemeClr val="accent1"/>
+            </a:lnRef>
+            <a:fillRef idx="3">
+              <a:schemeClr val="accent1"/>
+            </a:fillRef>
+            <a:effectRef idx="2">
+              <a:schemeClr val="accent1"/>
+            </a:effectRef>
+            <a:fontRef idx="minor">
+              <a:schemeClr val="dk1">
+                <a:hueOff val="0"/>
+                <a:satOff val="0"/>
+                <a:lumOff val="0"/>
+                <a:alphaOff val="0"/>
+              </a:schemeClr>
+            </a:fontRef>
+          </p:style>
+          <p:txBody>
+            <a:bodyPr spcFirstLastPara="0" vert="horz" wrap="square" lIns="53263" tIns="42468" rIns="53263" bIns="42468" numCol="1" spcCol="1270" anchor="ctr" anchorCtr="0">
+              <a:noAutofit/>
+            </a:bodyPr>
+            <a:lstStyle/>
+            <a:p>
+              <a:pPr marL="0" lvl="0" indent="0" algn="ctr" defTabSz="755650">
+                <a:lnSpc>
+                  <a:spcPct val="90000"/>
+                </a:lnSpc>
+                <a:spcBef>
+                  <a:spcPct val="0"/>
+                </a:spcBef>
+                <a:spcAft>
+                  <a:spcPct val="35000"/>
+                </a:spcAft>
+                <a:buNone/>
+              </a:pPr>
+              <a:r>
+                <a:rPr lang="en-US" sz="1700" b="0" kern="1200" cap="none" spc="0" dirty="0">
+                  <a:ln w="0"/>
+                  <a:solidFill>
+                    <a:schemeClr val="tx1"/>
+                  </a:solidFill>
+                  <a:effectLst>
+                    <a:outerShdw blurRad="38100" dist="19050" dir="2700000" algn="tl" rotWithShape="0">
+                      <a:schemeClr val="dk1">
+                        <a:alpha val="40000"/>
+                      </a:schemeClr>
+                    </a:outerShdw>
+                  </a:effectLst>
+                </a:rPr>
+                <a:t>Templates</a:t>
+              </a:r>
+            </a:p>
+          </p:txBody>
+        </p:sp>
+      </p:grpSp>
     </p:spTree>
     <p:extLst>
       <p:ext uri="{BB962C8B-B14F-4D97-AF65-F5344CB8AC3E}">
@@ -19367,6 +20823,59 @@
                                         <p:cTn id="7" dur="1000"/>
                                         <p:tgtEl>
                                           <p:spTgt spid="4"/>
+                                        </p:tgtEl>
+                                      </p:cBhvr>
+                                    </p:animEffect>
+                                  </p:childTnLst>
+                                </p:cTn>
+                              </p:par>
+                            </p:childTnLst>
+                          </p:cTn>
+                        </p:par>
+                      </p:childTnLst>
+                    </p:cTn>
+                  </p:par>
+                  <p:par>
+                    <p:cTn id="8" fill="hold">
+                      <p:stCondLst>
+                        <p:cond delay="indefinite"/>
+                      </p:stCondLst>
+                      <p:childTnLst>
+                        <p:par>
+                          <p:cTn id="9" fill="hold">
+                            <p:stCondLst>
+                              <p:cond delay="0"/>
+                            </p:stCondLst>
+                            <p:childTnLst>
+                              <p:par>
+                                <p:cTn id="10" presetID="10" presetClass="entr" presetSubtype="0" fill="hold" nodeType="clickEffect">
+                                  <p:stCondLst>
+                                    <p:cond delay="0"/>
+                                  </p:stCondLst>
+                                  <p:childTnLst>
+                                    <p:set>
+                                      <p:cBhvr>
+                                        <p:cTn id="11" dur="1" fill="hold">
+                                          <p:stCondLst>
+                                            <p:cond delay="0"/>
+                                          </p:stCondLst>
+                                        </p:cTn>
+                                        <p:tgtEl>
+                                          <p:spTgt spid="7"/>
+                                        </p:tgtEl>
+                                        <p:attrNameLst>
+                                          <p:attrName>style.visibility</p:attrName>
+                                        </p:attrNameLst>
+                                      </p:cBhvr>
+                                      <p:to>
+                                        <p:strVal val="visible"/>
+                                      </p:to>
+                                    </p:set>
+                                    <p:animEffect transition="in" filter="fade">
+                                      <p:cBhvr>
+                                        <p:cTn id="12" dur="500"/>
+                                        <p:tgtEl>
+                                          <p:spTgt spid="7"/>
                                         </p:tgtEl>
                                       </p:cBhvr>
                                     </p:animEffect>
@@ -21623,7 +23132,7 @@
         </p:nvSpPr>
         <p:spPr>
           <a:xfrm>
-            <a:off x="2611808" y="1885285"/>
+            <a:off x="2256208" y="1620856"/>
             <a:ext cx="7796540" cy="3997828"/>
           </a:xfrm>
         </p:spPr>
@@ -21639,13 +23148,19 @@
           <a:p>
             <a:r>
               <a:rPr lang="en-US" sz="2400" dirty="0"/>
+              <a:t>Configurations often have many parameters which add variance</a:t>
+            </a:r>
+          </a:p>
+          <a:p>
+            <a:r>
+              <a:rPr lang="en-US" sz="2400" dirty="0"/>
               <a:t>We may need long histories of snapshots</a:t>
             </a:r>
           </a:p>
           <a:p>
             <a:r>
               <a:rPr lang="en-US" sz="2400" dirty="0"/>
-              <a:t> Some networks may not have any existing configurations to help build a model</a:t>
+              <a:t>Some networks may not have any existing configurations to help build a model</a:t>
             </a:r>
           </a:p>
           <a:p>
@@ -21827,6 +23342,55 @@
                                           <p:spTgt spid="3">
                                             <p:txEl>
                                               <p:pRg st="2" end="2"/>
+                                            </p:txEl>
+                                          </p:spTgt>
+                                        </p:tgtEl>
+                                        <p:attrNameLst>
+                                          <p:attrName>style.visibility</p:attrName>
+                                        </p:attrNameLst>
+                                      </p:cBhvr>
+                                      <p:to>
+                                        <p:strVal val="visible"/>
+                                      </p:to>
+                                    </p:set>
+                                  </p:childTnLst>
+                                </p:cTn>
+                              </p:par>
+                            </p:childTnLst>
+                          </p:cTn>
+                        </p:par>
+                      </p:childTnLst>
+                    </p:cTn>
+                  </p:par>
+                  <p:par>
+                    <p:cTn id="15" fill="hold">
+                      <p:stCondLst>
+                        <p:cond delay="indefinite"/>
+                      </p:stCondLst>
+                      <p:childTnLst>
+                        <p:par>
+                          <p:cTn id="16" fill="hold">
+                            <p:stCondLst>
+                              <p:cond delay="0"/>
+                            </p:stCondLst>
+                            <p:childTnLst>
+                              <p:par>
+                                <p:cTn id="17" presetID="1" presetClass="entr" presetSubtype="0" fill="hold" nodeType="clickEffect">
+                                  <p:stCondLst>
+                                    <p:cond delay="0"/>
+                                  </p:stCondLst>
+                                  <p:childTnLst>
+                                    <p:set>
+                                      <p:cBhvr>
+                                        <p:cTn id="18" dur="1" fill="hold">
+                                          <p:stCondLst>
+                                            <p:cond delay="0"/>
+                                          </p:stCondLst>
+                                        </p:cTn>
+                                        <p:tgtEl>
+                                          <p:spTgt spid="3">
+                                            <p:txEl>
+                                              <p:pRg st="3" end="3"/>
                                             </p:txEl>
                                           </p:spTgt>
                                         </p:tgtEl>

</xml_diff>

<commit_message>
Finalized updates to results - need to update all graphs
</commit_message>
<xml_diff>
--- a/Final Presentation.pptx
+++ b/Final Presentation.pptx
@@ -5923,7 +5923,7 @@
           <a:p>
             <a:fld id="{E4C4B1B4-8AC2-E045-9F23-0D8D57885CA1}" type="datetimeFigureOut">
               <a:rPr lang="en-US" smtClean="0"/>
-              <a:t>5/1/18</a:t>
+              <a:t>5/8/18</a:t>
             </a:fld>
             <a:endParaRPr lang="en-US"/>
           </a:p>
@@ -6594,11 +6594,7 @@
             </a:r>
             <a:r>
               <a:rPr lang="en-US" dirty="0"/>
-              <a:t> seen </a:t>
-            </a:r>
-            <a:r>
-              <a:rPr lang="en-US"/>
-              <a:t>most things</a:t>
+              <a:t> seen most things</a:t>
             </a:r>
           </a:p>
         </p:txBody>
@@ -7376,7 +7372,7 @@
             </a:r>
             <a:r>
               <a:rPr lang="en-US" dirty="0" err="1"/>
-              <a:t>vlans</a:t>
+              <a:t>vl#ians</a:t>
             </a:r>
             <a:r>
               <a:rPr lang="en-US" dirty="0"/>
@@ -7638,7 +7634,7 @@
           <a:p>
             <a:fld id="{C9EC861A-1F0C-744A-84D0-7C9AAB3786C9}" type="datetime1">
               <a:rPr lang="en-US" smtClean="0"/>
-              <a:t>5/1/18</a:t>
+              <a:t>5/8/18</a:t>
             </a:fld>
             <a:endParaRPr lang="en-US" dirty="0"/>
           </a:p>
@@ -7973,7 +7969,7 @@
           <a:p>
             <a:fld id="{085C0705-305D-1947-B375-615969C78305}" type="datetime1">
               <a:rPr lang="en-US" smtClean="0"/>
-              <a:t>5/1/18</a:t>
+              <a:t>5/8/18</a:t>
             </a:fld>
             <a:endParaRPr lang="en-US" dirty="0"/>
           </a:p>
@@ -8276,7 +8272,7 @@
           <a:p>
             <a:fld id="{505993C2-3383-3D45-B934-7D563DF0A331}" type="datetime1">
               <a:rPr lang="en-US" smtClean="0"/>
-              <a:t>5/1/18</a:t>
+              <a:t>5/8/18</a:t>
             </a:fld>
             <a:endParaRPr lang="en-US" dirty="0"/>
           </a:p>
@@ -8524,7 +8520,7 @@
           <a:p>
             <a:fld id="{51A9D42D-BE17-1048-9024-8A41131D2766}" type="datetime1">
               <a:rPr lang="en-US" smtClean="0"/>
-              <a:t>5/1/18</a:t>
+              <a:t>5/8/18</a:t>
             </a:fld>
             <a:endParaRPr lang="en-US" dirty="0"/>
           </a:p>
@@ -8932,7 +8928,7 @@
           <a:p>
             <a:fld id="{677A8BB9-6AE0-0D4A-B263-8BFEFAE12FCF}" type="datetime1">
               <a:rPr lang="en-US" smtClean="0"/>
-              <a:t>5/1/18</a:t>
+              <a:t>5/8/18</a:t>
             </a:fld>
             <a:endParaRPr lang="en-US" dirty="0"/>
           </a:p>
@@ -9247,7 +9243,7 @@
           <a:p>
             <a:fld id="{E1B61537-1452-5B48-B068-4BD78A701136}" type="datetime1">
               <a:rPr lang="en-US" smtClean="0"/>
-              <a:t>5/1/18</a:t>
+              <a:t>5/8/18</a:t>
             </a:fld>
             <a:endParaRPr lang="en-US" dirty="0"/>
           </a:p>
@@ -9792,7 +9788,7 @@
           <a:p>
             <a:fld id="{DD70666A-7DC2-B94B-9678-99A23E5D620C}" type="datetime1">
               <a:rPr lang="en-US" smtClean="0"/>
-              <a:t>5/1/18</a:t>
+              <a:t>5/8/18</a:t>
             </a:fld>
             <a:endParaRPr lang="en-US" dirty="0"/>
           </a:p>
@@ -9988,7 +9984,7 @@
           <a:p>
             <a:fld id="{6A7AEBC1-B868-214C-965D-76A7D2E7B07F}" type="datetime1">
               <a:rPr lang="en-US" smtClean="0"/>
-              <a:t>5/1/18</a:t>
+              <a:t>5/8/18</a:t>
             </a:fld>
             <a:endParaRPr lang="en-US" dirty="0"/>
           </a:p>
@@ -10202,7 +10198,7 @@
           <a:p>
             <a:fld id="{C0558313-3C42-2148-A548-6151C82DA30D}" type="datetime1">
               <a:rPr lang="en-US" smtClean="0"/>
-              <a:t>5/1/18</a:t>
+              <a:t>5/8/18</a:t>
             </a:fld>
             <a:endParaRPr lang="en-US" dirty="0"/>
           </a:p>
@@ -10572,7 +10568,7 @@
           <a:p>
             <a:fld id="{E6FF4B98-E8AE-7A42-8C0A-BABFD61FC319}" type="datetime1">
               <a:rPr lang="en-US" smtClean="0"/>
-              <a:t>5/1/18</a:t>
+              <a:t>5/8/18</a:t>
             </a:fld>
             <a:endParaRPr lang="en-US" dirty="0"/>
           </a:p>
@@ -10976,7 +10972,7 @@
           <a:p>
             <a:fld id="{76C677ED-0C49-2A49-B260-648423C5E062}" type="datetime1">
               <a:rPr lang="en-US" smtClean="0"/>
-              <a:t>5/1/18</a:t>
+              <a:t>5/8/18</a:t>
             </a:fld>
             <a:endParaRPr lang="en-US" dirty="0"/>
           </a:p>
@@ -11315,7 +11311,7 @@
           <a:p>
             <a:fld id="{85379E05-B417-D645-B173-FD935FED8562}" type="datetime1">
               <a:rPr lang="en-US" smtClean="0"/>
-              <a:t>5/1/18</a:t>
+              <a:t>5/8/18</a:t>
             </a:fld>
             <a:endParaRPr lang="en-US" dirty="0"/>
           </a:p>
@@ -14324,7 +14320,7 @@
         </p:nvSpPr>
         <p:spPr>
           <a:xfrm>
-            <a:off x="6743700" y="1839061"/>
+            <a:off x="6036331" y="2115109"/>
             <a:ext cx="4114303" cy="4839251"/>
           </a:xfrm>
           <a:prstGeom prst="flowChartDocument">
@@ -14549,7 +14545,7 @@
         </p:nvSpPr>
         <p:spPr>
           <a:xfrm>
-            <a:off x="1365250" y="1839061"/>
+            <a:off x="1365250" y="2115109"/>
             <a:ext cx="4081173" cy="4839251"/>
           </a:xfrm>
           <a:prstGeom prst="flowChartDocument">
@@ -14677,7 +14673,7 @@
         </p:nvSpPr>
         <p:spPr>
           <a:xfrm>
-            <a:off x="1607088" y="4080887"/>
+            <a:off x="1607088" y="4356935"/>
             <a:ext cx="1232452" cy="867373"/>
           </a:xfrm>
           <a:prstGeom prst="wedgeRectCallout">
@@ -14743,7 +14739,7 @@
         </p:nvSpPr>
         <p:spPr>
           <a:xfrm>
-            <a:off x="1738990" y="4408361"/>
+            <a:off x="1738990" y="4659695"/>
             <a:ext cx="1006601" cy="331582"/>
           </a:xfrm>
           <a:prstGeom prst="ellipse">
@@ -14795,7 +14791,7 @@
         </p:nvSpPr>
         <p:spPr>
           <a:xfrm>
-            <a:off x="1751690" y="3554207"/>
+            <a:off x="1751690" y="3830255"/>
             <a:ext cx="943249" cy="338554"/>
           </a:xfrm>
           <a:prstGeom prst="rect">
@@ -14834,7 +14830,7 @@
         </p:nvSpPr>
         <p:spPr>
           <a:xfrm>
-            <a:off x="7250791" y="3561179"/>
+            <a:off x="6506351" y="3837227"/>
             <a:ext cx="864510" cy="331582"/>
           </a:xfrm>
           <a:prstGeom prst="ellipse">
@@ -14886,7 +14882,59 @@
         </p:nvSpPr>
         <p:spPr>
           <a:xfrm>
-            <a:off x="1219200" y="3632200"/>
+            <a:off x="1365249" y="3890995"/>
+            <a:ext cx="241839" cy="235161"/>
+          </a:xfrm>
+          <a:prstGeom prst="rightArrow">
+            <a:avLst/>
+          </a:prstGeom>
+          <a:solidFill>
+            <a:srgbClr val="FF0000"/>
+          </a:solidFill>
+          <a:ln>
+            <a:noFill/>
+          </a:ln>
+        </p:spPr>
+        <p:style>
+          <a:lnRef idx="2">
+            <a:schemeClr val="accent1">
+              <a:shade val="50000"/>
+            </a:schemeClr>
+          </a:lnRef>
+          <a:fillRef idx="1">
+            <a:schemeClr val="accent1"/>
+          </a:fillRef>
+          <a:effectRef idx="0">
+            <a:schemeClr val="accent1"/>
+          </a:effectRef>
+          <a:fontRef idx="minor">
+            <a:schemeClr val="lt1"/>
+          </a:fontRef>
+        </p:style>
+        <p:txBody>
+          <a:bodyPr rtlCol="0" anchor="ctr"/>
+          <a:lstStyle/>
+          <a:p>
+            <a:pPr algn="ctr"/>
+            <a:endParaRPr lang="en-US"/>
+          </a:p>
+        </p:txBody>
+      </p:sp>
+      <p:sp>
+        <p:nvSpPr>
+          <p:cNvPr id="15" name="Right Arrow 14">
+            <a:extLst>
+              <a:ext uri="{FF2B5EF4-FFF2-40B4-BE49-F238E27FC236}">
+                <a16:creationId xmlns:a16="http://schemas.microsoft.com/office/drawing/2014/main" id="{C0F943D2-FAEB-2045-8D54-5781C9D3841A}"/>
+              </a:ext>
+            </a:extLst>
+          </p:cNvPr>
+          <p:cNvSpPr/>
+          <p:nvPr/>
+        </p:nvSpPr>
+        <p:spPr>
+          <a:xfrm>
+            <a:off x="6036331" y="3908248"/>
             <a:ext cx="292100" cy="235161"/>
           </a:xfrm>
           <a:prstGeom prst="rightArrow">
@@ -14926,53 +14974,72 @@
       </p:sp>
       <p:sp>
         <p:nvSpPr>
-          <p:cNvPr id="15" name="Right Arrow 14">
+          <p:cNvPr id="3" name="TextBox 2">
             <a:extLst>
               <a:ext uri="{FF2B5EF4-FFF2-40B4-BE49-F238E27FC236}">
-                <a16:creationId xmlns:a16="http://schemas.microsoft.com/office/drawing/2014/main" id="{C0F943D2-FAEB-2045-8D54-5781C9D3841A}"/>
+                <a16:creationId xmlns:a16="http://schemas.microsoft.com/office/drawing/2014/main" id="{A6EDEC0B-36C4-CE43-A305-6D930B972D17}"/>
               </a:ext>
             </a:extLst>
           </p:cNvPr>
-          <p:cNvSpPr/>
+          <p:cNvSpPr txBox="1"/>
           <p:nvPr/>
         </p:nvSpPr>
         <p:spPr>
           <a:xfrm>
-            <a:off x="6743700" y="3632200"/>
-            <a:ext cx="292100" cy="235161"/>
+            <a:off x="1365250" y="1602834"/>
+            <a:ext cx="4081173" cy="369332"/>
           </a:xfrm>
-          <a:prstGeom prst="rightArrow">
+          <a:prstGeom prst="rect">
             <a:avLst/>
           </a:prstGeom>
-          <a:solidFill>
-            <a:srgbClr val="FF0000"/>
-          </a:solidFill>
-          <a:ln>
-            <a:noFill/>
-          </a:ln>
+          <a:noFill/>
         </p:spPr>
-        <p:style>
-          <a:lnRef idx="2">
-            <a:schemeClr val="accent1">
-              <a:shade val="50000"/>
-            </a:schemeClr>
-          </a:lnRef>
-          <a:fillRef idx="1">
-            <a:schemeClr val="accent1"/>
-          </a:fillRef>
-          <a:effectRef idx="0">
-            <a:schemeClr val="accent1"/>
-          </a:effectRef>
-          <a:fontRef idx="minor">
-            <a:schemeClr val="lt1"/>
-          </a:fontRef>
-        </p:style>
         <p:txBody>
-          <a:bodyPr rtlCol="0" anchor="ctr"/>
+          <a:bodyPr wrap="square" rtlCol="0">
+            <a:spAutoFit/>
+          </a:bodyPr>
           <a:lstStyle/>
           <a:p>
+            <a:r>
+              <a:rPr lang="en-US" dirty="0"/>
+              <a:t>Configuration “Rebuilt” Using Model</a:t>
+            </a:r>
+          </a:p>
+        </p:txBody>
+      </p:sp>
+      <p:sp>
+        <p:nvSpPr>
+          <p:cNvPr id="16" name="TextBox 15">
+            <a:extLst>
+              <a:ext uri="{FF2B5EF4-FFF2-40B4-BE49-F238E27FC236}">
+                <a16:creationId xmlns:a16="http://schemas.microsoft.com/office/drawing/2014/main" id="{89D7E371-CE22-9B45-84E0-D311E35CF26A}"/>
+              </a:ext>
+            </a:extLst>
+          </p:cNvPr>
+          <p:cNvSpPr txBox="1"/>
+          <p:nvPr/>
+        </p:nvSpPr>
+        <p:spPr>
+          <a:xfrm>
+            <a:off x="6020118" y="1601156"/>
+            <a:ext cx="4081173" cy="369332"/>
+          </a:xfrm>
+          <a:prstGeom prst="rect">
+            <a:avLst/>
+          </a:prstGeom>
+          <a:noFill/>
+        </p:spPr>
+        <p:txBody>
+          <a:bodyPr wrap="square" rtlCol="0">
+            <a:spAutoFit/>
+          </a:bodyPr>
+          <a:lstStyle/>
+          <a:p>
             <a:pPr algn="ctr"/>
-            <a:endParaRPr lang="en-US"/>
+            <a:r>
+              <a:rPr lang="en-US" dirty="0"/>
+              <a:t>Original Configuration</a:t>
+            </a:r>
           </a:p>
         </p:txBody>
       </p:sp>

</xml_diff>